<commit_message>
Added slides about "module tooling"
Psake, plaster, pester, platyps, psdeploy, buildhelpers
</commit_message>
<xml_diff>
--- a/PowerShell Modules.pptx
+++ b/PowerShell Modules.pptx
@@ -9,17 +9,23 @@
     <p:sldId id="257" r:id="rId3"/>
     <p:sldId id="258" r:id="rId4"/>
     <p:sldId id="259" r:id="rId5"/>
-    <p:sldId id="270" r:id="rId6"/>
-    <p:sldId id="260" r:id="rId7"/>
-    <p:sldId id="261" r:id="rId8"/>
-    <p:sldId id="262" r:id="rId9"/>
-    <p:sldId id="269" r:id="rId10"/>
-    <p:sldId id="263" r:id="rId11"/>
-    <p:sldId id="264" r:id="rId12"/>
-    <p:sldId id="265" r:id="rId13"/>
-    <p:sldId id="268" r:id="rId14"/>
-    <p:sldId id="266" r:id="rId15"/>
-    <p:sldId id="267" r:id="rId16"/>
+    <p:sldId id="260" r:id="rId6"/>
+    <p:sldId id="261" r:id="rId7"/>
+    <p:sldId id="262" r:id="rId8"/>
+    <p:sldId id="269" r:id="rId9"/>
+    <p:sldId id="263" r:id="rId10"/>
+    <p:sldId id="264" r:id="rId11"/>
+    <p:sldId id="265" r:id="rId12"/>
+    <p:sldId id="268" r:id="rId13"/>
+    <p:sldId id="266" r:id="rId14"/>
+    <p:sldId id="267" r:id="rId15"/>
+    <p:sldId id="271" r:id="rId16"/>
+    <p:sldId id="272" r:id="rId17"/>
+    <p:sldId id="273" r:id="rId18"/>
+    <p:sldId id="270" r:id="rId19"/>
+    <p:sldId id="275" r:id="rId20"/>
+    <p:sldId id="276" r:id="rId21"/>
+    <p:sldId id="274" r:id="rId22"/>
   </p:sldIdLst>
   <p:sldSz cx="12192000" cy="6858000"/>
   <p:notesSz cx="6858000" cy="9144000"/>
@@ -124,10 +130,6 @@
     </p:ext>
   </p:extLst>
 </p:presentation>
-</file>
-
-<file path=ppt/revisionInfo.xml><?xml version="1.0" encoding="utf-8"?>
-<p1510:revInfo xmlns:a="http://schemas.openxmlformats.org/drawingml/2006/main" xmlns:r="http://schemas.openxmlformats.org/officeDocument/2006/relationships" xmlns:p1510="http://schemas.microsoft.com/office/powerpoint/2015/10/main"/>
 </file>
 
 <file path=ppt/slideLayouts/slideLayout1.xml><?xml version="1.0" encoding="utf-8"?>
@@ -876,7 +878,7 @@
             <a:fld id="{B61BEF0D-F0BB-DE4B-95CE-6DB70DBA9567}" type="datetimeFigureOut">
               <a:rPr lang="en-US" dirty="0"/>
               <a:pPr/>
-              <a:t>5/1/2018</a:t>
+              <a:t>7/9/2018</a:t>
             </a:fld>
             <a:endParaRPr lang="en-US" dirty="0"/>
           </a:p>
@@ -1124,7 +1126,7 @@
             <a:fld id="{B61BEF0D-F0BB-DE4B-95CE-6DB70DBA9567}" type="datetimeFigureOut">
               <a:rPr lang="en-US" dirty="0"/>
               <a:pPr/>
-              <a:t>5/1/2018</a:t>
+              <a:t>7/9/2018</a:t>
             </a:fld>
             <a:endParaRPr lang="en-US" dirty="0"/>
           </a:p>
@@ -1435,7 +1437,7 @@
             <a:fld id="{B61BEF0D-F0BB-DE4B-95CE-6DB70DBA9567}" type="datetimeFigureOut">
               <a:rPr lang="en-US" dirty="0"/>
               <a:pPr/>
-              <a:t>5/1/2018</a:t>
+              <a:t>7/9/2018</a:t>
             </a:fld>
             <a:endParaRPr lang="en-US" dirty="0"/>
           </a:p>
@@ -1765,7 +1767,7 @@
             <a:fld id="{B61BEF0D-F0BB-DE4B-95CE-6DB70DBA9567}" type="datetimeFigureOut">
               <a:rPr lang="en-US" dirty="0"/>
               <a:pPr/>
-              <a:t>5/1/2018</a:t>
+              <a:t>7/9/2018</a:t>
             </a:fld>
             <a:endParaRPr lang="en-US" dirty="0"/>
           </a:p>
@@ -2076,7 +2078,7 @@
             <a:fld id="{B61BEF0D-F0BB-DE4B-95CE-6DB70DBA9567}" type="datetimeFigureOut">
               <a:rPr lang="en-US" dirty="0"/>
               <a:pPr/>
-              <a:t>5/1/2018</a:t>
+              <a:t>7/9/2018</a:t>
             </a:fld>
             <a:endParaRPr lang="en-US" dirty="0"/>
           </a:p>
@@ -2466,7 +2468,7 @@
             <a:fld id="{B61BEF0D-F0BB-DE4B-95CE-6DB70DBA9567}" type="datetimeFigureOut">
               <a:rPr lang="en-US" dirty="0"/>
               <a:pPr/>
-              <a:t>5/1/2018</a:t>
+              <a:t>7/9/2018</a:t>
             </a:fld>
             <a:endParaRPr lang="en-US" dirty="0"/>
           </a:p>
@@ -2632,7 +2634,7 @@
           <a:p>
             <a:fld id="{55C6B4A9-1611-4792-9094-5F34BCA07E0B}" type="datetimeFigureOut">
               <a:rPr lang="en-US" dirty="0"/>
-              <a:t>5/1/2018</a:t>
+              <a:t>7/9/2018</a:t>
             </a:fld>
             <a:endParaRPr lang="en-US" dirty="0"/>
           </a:p>
@@ -2808,7 +2810,7 @@
             <a:fld id="{B61BEF0D-F0BB-DE4B-95CE-6DB70DBA9567}" type="datetimeFigureOut">
               <a:rPr lang="en-US" dirty="0"/>
               <a:pPr/>
-              <a:t>5/1/2018</a:t>
+              <a:t>7/9/2018</a:t>
             </a:fld>
             <a:endParaRPr lang="en-US" dirty="0"/>
           </a:p>
@@ -2974,7 +2976,7 @@
           <a:p>
             <a:fld id="{42A54C80-263E-416B-A8E0-580EDEADCBDC}" type="datetimeFigureOut">
               <a:rPr lang="en-US" dirty="0"/>
-              <a:t>5/1/2018</a:t>
+              <a:t>7/9/2018</a:t>
             </a:fld>
             <a:endParaRPr lang="en-US" dirty="0"/>
           </a:p>
@@ -3217,7 +3219,7 @@
             <a:fld id="{B61BEF0D-F0BB-DE4B-95CE-6DB70DBA9567}" type="datetimeFigureOut">
               <a:rPr lang="en-US" dirty="0"/>
               <a:pPr/>
-              <a:t>5/1/2018</a:t>
+              <a:t>7/9/2018</a:t>
             </a:fld>
             <a:endParaRPr lang="en-US" dirty="0"/>
           </a:p>
@@ -3445,7 +3447,7 @@
           <a:p>
             <a:fld id="{42A54C80-263E-416B-A8E0-580EDEADCBDC}" type="datetimeFigureOut">
               <a:rPr lang="en-US" dirty="0"/>
-              <a:t>5/1/2018</a:t>
+              <a:t>7/9/2018</a:t>
             </a:fld>
             <a:endParaRPr lang="en-US" dirty="0"/>
           </a:p>
@@ -3815,7 +3817,7 @@
             <a:fld id="{B61BEF0D-F0BB-DE4B-95CE-6DB70DBA9567}" type="datetimeFigureOut">
               <a:rPr lang="en-US" dirty="0"/>
               <a:pPr/>
-              <a:t>5/1/2018</a:t>
+              <a:t>7/9/2018</a:t>
             </a:fld>
             <a:endParaRPr lang="en-US" dirty="0"/>
           </a:p>
@@ -3935,7 +3937,7 @@
             <a:fld id="{B61BEF0D-F0BB-DE4B-95CE-6DB70DBA9567}" type="datetimeFigureOut">
               <a:rPr lang="en-US" dirty="0"/>
               <a:pPr/>
-              <a:t>5/1/2018</a:t>
+              <a:t>7/9/2018</a:t>
             </a:fld>
             <a:endParaRPr lang="en-US" dirty="0"/>
           </a:p>
@@ -4027,7 +4029,7 @@
             <a:fld id="{B61BEF0D-F0BB-DE4B-95CE-6DB70DBA9567}" type="datetimeFigureOut">
               <a:rPr lang="en-US" dirty="0"/>
               <a:pPr/>
-              <a:t>5/1/2018</a:t>
+              <a:t>7/9/2018</a:t>
             </a:fld>
             <a:endParaRPr lang="en-US" dirty="0"/>
           </a:p>
@@ -4278,7 +4280,7 @@
           <a:p>
             <a:fld id="{42A54C80-263E-416B-A8E0-580EDEADCBDC}" type="datetimeFigureOut">
               <a:rPr lang="en-US" dirty="0"/>
-              <a:t>5/1/2018</a:t>
+              <a:t>7/9/2018</a:t>
             </a:fld>
             <a:endParaRPr lang="en-US" dirty="0"/>
           </a:p>
@@ -4580,7 +4582,7 @@
             <a:fld id="{B61BEF0D-F0BB-DE4B-95CE-6DB70DBA9567}" type="datetimeFigureOut">
               <a:rPr lang="en-US" dirty="0"/>
               <a:pPr/>
-              <a:t>5/1/2018</a:t>
+              <a:t>7/9/2018</a:t>
             </a:fld>
             <a:endParaRPr lang="en-US" dirty="0"/>
           </a:p>
@@ -5278,7 +5280,7 @@
             <a:fld id="{B61BEF0D-F0BB-DE4B-95CE-6DB70DBA9567}" type="datetimeFigureOut">
               <a:rPr lang="en-US" dirty="0"/>
               <a:pPr/>
-              <a:t>5/1/2018</a:t>
+              <a:t>7/9/2018</a:t>
             </a:fld>
             <a:endParaRPr lang="en-US" dirty="0"/>
           </a:p>
@@ -5821,7 +5823,7 @@
           <a:p>
             <a:r>
               <a:rPr lang="en-US" dirty="0"/>
-              <a:t>PowerShell Modules</a:t>
+              <a:t>PowerShell Modules (take two)</a:t>
             </a:r>
           </a:p>
         </p:txBody>
@@ -5920,7 +5922,7 @@
           <p:cNvPr id="2" name="Title 1">
             <a:extLst>
               <a:ext uri="{FF2B5EF4-FFF2-40B4-BE49-F238E27FC236}">
-                <a16:creationId xmlns:a16="http://schemas.microsoft.com/office/drawing/2014/main" id="{25525F8C-492F-437A-83B7-E584D4A0ED85}"/>
+                <a16:creationId xmlns:a16="http://schemas.microsoft.com/office/drawing/2014/main" id="{26C63AA1-16B6-4826-84B0-A03B65E792CB}"/>
               </a:ext>
             </a:extLst>
           </p:cNvPr>
@@ -5931,19 +5933,14 @@
             <p:ph type="title"/>
           </p:nvPr>
         </p:nvSpPr>
-        <p:spPr>
-          <a:xfrm>
-            <a:off x="677334" y="609600"/>
-            <a:ext cx="8596668" cy="741028"/>
-          </a:xfrm>
-        </p:spPr>
-        <p:txBody>
-          <a:bodyPr/>
-          <a:lstStyle/>
-          <a:p>
-            <a:r>
-              <a:rPr lang="en-US" dirty="0"/>
-              <a:t>CIM Modules</a:t>
+        <p:spPr/>
+        <p:txBody>
+          <a:bodyPr/>
+          <a:lstStyle/>
+          <a:p>
+            <a:r>
+              <a:rPr lang="en-US" dirty="0"/>
+              <a:t>Controlling Exports</a:t>
             </a:r>
           </a:p>
         </p:txBody>
@@ -5953,7 +5950,7 @@
           <p:cNvPr id="3" name="Content Placeholder 2">
             <a:extLst>
               <a:ext uri="{FF2B5EF4-FFF2-40B4-BE49-F238E27FC236}">
-                <a16:creationId xmlns:a16="http://schemas.microsoft.com/office/drawing/2014/main" id="{F4B4FC8F-F5F1-477B-8360-43D13C97F715}"/>
+                <a16:creationId xmlns:a16="http://schemas.microsoft.com/office/drawing/2014/main" id="{4260039F-9618-4803-957C-A369E99B1B1B}"/>
               </a:ext>
             </a:extLst>
           </p:cNvPr>
@@ -5971,50 +5968,60 @@
           <a:p>
             <a:r>
               <a:rPr lang="en-US" dirty="0"/>
-              <a:t>Modules based on CIM Classes (and cmdlets)</a:t>
-            </a:r>
-          </a:p>
-          <a:p>
-            <a:r>
-              <a:rPr lang="en-US" dirty="0"/>
-              <a:t>Cmdlet definitions are actually just XML mapping parameters (mostly) to CIM Class properties</a:t>
-            </a:r>
-          </a:p>
-          <a:p>
-            <a:r>
-              <a:rPr lang="en-US" dirty="0"/>
-              <a:t>Example: </a:t>
+              <a:t>Dot-sourcing</a:t>
+            </a:r>
+          </a:p>
+          <a:p>
+            <a:pPr lvl="1"/>
+            <a:r>
+              <a:rPr lang="en-US" dirty="0"/>
+              <a:t>Exports all cmdlets, functions, aliases, variables</a:t>
+            </a:r>
+          </a:p>
+          <a:p>
+            <a:r>
+              <a:rPr lang="en-US" dirty="0"/>
+              <a:t>By default, importing a module</a:t>
+            </a:r>
+          </a:p>
+          <a:p>
+            <a:pPr lvl="1"/>
+            <a:r>
+              <a:rPr lang="en-US" dirty="0"/>
+              <a:t>Exports all functions (only!)</a:t>
+            </a:r>
+          </a:p>
+          <a:p>
+            <a:pPr lvl="1"/>
+            <a:r>
+              <a:rPr lang="en-US" dirty="0"/>
+              <a:t>This gives the opportunity for information hiding (and obscuring implementation)</a:t>
+            </a:r>
+          </a:p>
+          <a:p>
+            <a:r>
+              <a:rPr lang="en-US" dirty="0"/>
+              <a:t>To override the default behavior, you can use the Export-</a:t>
             </a:r>
             <a:r>
               <a:rPr lang="en-US" dirty="0" err="1"/>
-              <a:t>SMBShare</a:t>
-            </a:r>
-            <a:endParaRPr lang="en-US" dirty="0"/>
-          </a:p>
-          <a:p>
-            <a:r>
-              <a:rPr lang="en-US" dirty="0"/>
-              <a:t>C:\Windows\system32\WindowsPowerShell\v1.0\Modules\SmbShare</a:t>
-            </a:r>
-          </a:p>
-          <a:p>
-            <a:r>
-              <a:rPr lang="en-US" dirty="0"/>
-              <a:t>Interestingly, it’s actually a manifest module, but all it does in include nested </a:t>
-            </a:r>
-            <a:r>
-              <a:rPr lang="en-US" dirty="0" err="1"/>
-              <a:t>cdxml</a:t>
-            </a:r>
-            <a:r>
-              <a:rPr lang="en-US" dirty="0"/>
-              <a:t> modules (CIM Modules)</a:t>
-            </a:r>
-          </a:p>
-          <a:p>
-            <a:r>
-              <a:rPr lang="en-US" dirty="0"/>
-              <a:t>Demo</a:t>
+              <a:t>ModuleMember</a:t>
+            </a:r>
+            <a:r>
+              <a:rPr lang="en-US" dirty="0"/>
+              <a:t> cmdlet</a:t>
+            </a:r>
+          </a:p>
+          <a:p>
+            <a:r>
+              <a:rPr lang="en-US" dirty="0"/>
+              <a:t>It has –Function, -Variable, and –Alias parameters which allow lists and wildcards.</a:t>
+            </a:r>
+          </a:p>
+          <a:p>
+            <a:r>
+              <a:rPr lang="en-US" dirty="0"/>
+              <a:t>I recommend using –Function *-* or *-Noun</a:t>
             </a:r>
           </a:p>
         </p:txBody>
@@ -6022,7 +6029,7 @@
     </p:spTree>
     <p:extLst>
       <p:ext uri="{BB962C8B-B14F-4D97-AF65-F5344CB8AC3E}">
-        <p14:creationId xmlns:p14="http://schemas.microsoft.com/office/powerpoint/2010/main" val="1628238970"/>
+        <p14:creationId xmlns:p14="http://schemas.microsoft.com/office/powerpoint/2010/main" val="2862722240"/>
       </p:ext>
     </p:extLst>
   </p:cSld>
@@ -6054,7 +6061,7 @@
           <p:cNvPr id="2" name="Title 1">
             <a:extLst>
               <a:ext uri="{FF2B5EF4-FFF2-40B4-BE49-F238E27FC236}">
-                <a16:creationId xmlns:a16="http://schemas.microsoft.com/office/drawing/2014/main" id="{26C63AA1-16B6-4826-84B0-A03B65E792CB}"/>
+                <a16:creationId xmlns:a16="http://schemas.microsoft.com/office/drawing/2014/main" id="{59609858-4295-464E-8BC2-1872739BF186}"/>
               </a:ext>
             </a:extLst>
           </p:cNvPr>
@@ -6072,7 +6079,7 @@
           <a:p>
             <a:r>
               <a:rPr lang="en-US" dirty="0"/>
-              <a:t>Controlling Exports</a:t>
+              <a:t>Then it gets weird</a:t>
             </a:r>
           </a:p>
         </p:txBody>
@@ -6082,7 +6089,7 @@
           <p:cNvPr id="3" name="Content Placeholder 2">
             <a:extLst>
               <a:ext uri="{FF2B5EF4-FFF2-40B4-BE49-F238E27FC236}">
-                <a16:creationId xmlns:a16="http://schemas.microsoft.com/office/drawing/2014/main" id="{4260039F-9618-4803-957C-A369E99B1B1B}"/>
+                <a16:creationId xmlns:a16="http://schemas.microsoft.com/office/drawing/2014/main" id="{70B6B830-C60D-4944-A756-D6BDDCCA6CBD}"/>
               </a:ext>
             </a:extLst>
           </p:cNvPr>
@@ -6093,75 +6100,99 @@
             <p:ph idx="1"/>
           </p:nvPr>
         </p:nvSpPr>
-        <p:spPr/>
-        <p:txBody>
-          <a:bodyPr/>
-          <a:lstStyle/>
-          <a:p>
-            <a:r>
-              <a:rPr lang="en-US" dirty="0"/>
-              <a:t>Dot-sourcing</a:t>
-            </a:r>
-          </a:p>
-          <a:p>
-            <a:pPr lvl="1"/>
-            <a:r>
-              <a:rPr lang="en-US" dirty="0"/>
-              <a:t>Exports all cmdlets, functions, aliases, variables</a:t>
-            </a:r>
-          </a:p>
-          <a:p>
-            <a:r>
-              <a:rPr lang="en-US" dirty="0"/>
-              <a:t>By default, importing a module</a:t>
-            </a:r>
-          </a:p>
-          <a:p>
-            <a:pPr lvl="1"/>
-            <a:r>
-              <a:rPr lang="en-US" dirty="0"/>
-              <a:t>Exports all functions (only!)</a:t>
-            </a:r>
-          </a:p>
-          <a:p>
-            <a:pPr lvl="1"/>
-            <a:r>
-              <a:rPr lang="en-US" dirty="0"/>
-              <a:t>This gives the opportunity for information hiding (and obscuring implementation)</a:t>
-            </a:r>
-          </a:p>
-          <a:p>
-            <a:r>
-              <a:rPr lang="en-US" dirty="0"/>
-              <a:t>To override the default behavior, you can use the Export-</a:t>
+        <p:spPr>
+          <a:xfrm>
+            <a:off x="761224" y="1556581"/>
+            <a:ext cx="8596668" cy="3880773"/>
+          </a:xfrm>
+        </p:spPr>
+        <p:txBody>
+          <a:bodyPr>
+            <a:normAutofit fontScale="92500" lnSpcReduction="20000"/>
+          </a:bodyPr>
+          <a:lstStyle/>
+          <a:p>
+            <a:r>
+              <a:rPr lang="en-US" dirty="0"/>
+              <a:t>-</a:t>
             </a:r>
             <a:r>
               <a:rPr lang="en-US" dirty="0" err="1"/>
-              <a:t>ModuleMember</a:t>
-            </a:r>
-            <a:r>
-              <a:rPr lang="en-US" dirty="0"/>
-              <a:t> cmdlet</a:t>
-            </a:r>
-          </a:p>
-          <a:p>
-            <a:r>
-              <a:rPr lang="en-US" dirty="0"/>
-              <a:t>It has –Function, -Variable, and –Alias parameters which allow lists and wildcards.</a:t>
-            </a:r>
-          </a:p>
-          <a:p>
-            <a:r>
-              <a:rPr lang="en-US" dirty="0"/>
-              <a:t>I recommend using –Function *-* or *-Noun</a:t>
-            </a:r>
+              <a:t>AsCustomObject</a:t>
+            </a:r>
+            <a:endParaRPr lang="en-US" dirty="0"/>
+          </a:p>
+          <a:p>
+            <a:endParaRPr lang="en-US" dirty="0"/>
+          </a:p>
+          <a:p>
+            <a:r>
+              <a:rPr lang="en-US" dirty="0"/>
+              <a:t>Instead of importing variables and functions into the scope, it creates an object with properties and methods</a:t>
+            </a:r>
+          </a:p>
+          <a:p>
+            <a:r>
+              <a:rPr lang="en-US" dirty="0"/>
+              <a:t>Mapping PowerShell parameters onto method parameters is not a good prize</a:t>
+            </a:r>
+          </a:p>
+          <a:p>
+            <a:r>
+              <a:rPr lang="en-US" dirty="0"/>
+              <a:t>And </a:t>
+            </a:r>
+            <a:r>
+              <a:rPr lang="en-US" dirty="0" err="1"/>
+              <a:t>parametersets</a:t>
+            </a:r>
+            <a:r>
+              <a:rPr lang="en-US" dirty="0"/>
+              <a:t> don’t work.</a:t>
+            </a:r>
+          </a:p>
+          <a:p>
+            <a:r>
+              <a:rPr lang="en-US" dirty="0"/>
+              <a:t>Also, method names and dashes are not a good fit.</a:t>
+            </a:r>
+          </a:p>
+          <a:p>
+            <a:r>
+              <a:rPr lang="en-US" dirty="0"/>
+              <a:t>And…aliases are broken.</a:t>
+            </a:r>
+          </a:p>
+          <a:p>
+            <a:r>
+              <a:rPr lang="en-US" dirty="0"/>
+              <a:t>However, it does work in its own charming way</a:t>
+            </a:r>
+          </a:p>
+          <a:p>
+            <a:endParaRPr lang="en-US" dirty="0"/>
+          </a:p>
+          <a:p>
+            <a:r>
+              <a:rPr lang="en-US" dirty="0">
+                <a:hlinkClick r:id="rId2"/>
+              </a:rPr>
+              <a:t>https://powershellstation.com/2012/02/08/importing-modules-using-ascustomobject/</a:t>
+            </a:r>
+            <a:endParaRPr lang="en-US" dirty="0"/>
+          </a:p>
+          <a:p>
+            <a:endParaRPr lang="en-US" dirty="0"/>
+          </a:p>
+          <a:p>
+            <a:endParaRPr lang="en-US" dirty="0"/>
           </a:p>
         </p:txBody>
       </p:sp>
     </p:spTree>
     <p:extLst>
       <p:ext uri="{BB962C8B-B14F-4D97-AF65-F5344CB8AC3E}">
-        <p14:creationId xmlns:p14="http://schemas.microsoft.com/office/powerpoint/2010/main" val="2862722240"/>
+        <p14:creationId xmlns:p14="http://schemas.microsoft.com/office/powerpoint/2010/main" val="2629278362"/>
       </p:ext>
     </p:extLst>
   </p:cSld>
@@ -6193,7 +6224,7 @@
           <p:cNvPr id="2" name="Title 1">
             <a:extLst>
               <a:ext uri="{FF2B5EF4-FFF2-40B4-BE49-F238E27FC236}">
-                <a16:creationId xmlns:a16="http://schemas.microsoft.com/office/drawing/2014/main" id="{59609858-4295-464E-8BC2-1872739BF186}"/>
+                <a16:creationId xmlns:a16="http://schemas.microsoft.com/office/drawing/2014/main" id="{1736F393-2DBE-47FA-B330-50253DC56CB7}"/>
               </a:ext>
             </a:extLst>
           </p:cNvPr>
@@ -6204,14 +6235,19 @@
             <p:ph type="title"/>
           </p:nvPr>
         </p:nvSpPr>
-        <p:spPr/>
-        <p:txBody>
-          <a:bodyPr/>
-          <a:lstStyle/>
-          <a:p>
-            <a:r>
-              <a:rPr lang="en-US" dirty="0"/>
-              <a:t>Then it gets weird</a:t>
+        <p:spPr>
+          <a:xfrm>
+            <a:off x="677334" y="609600"/>
+            <a:ext cx="8596668" cy="841695"/>
+          </a:xfrm>
+        </p:spPr>
+        <p:txBody>
+          <a:bodyPr/>
+          <a:lstStyle/>
+          <a:p>
+            <a:r>
+              <a:rPr lang="en-US" dirty="0"/>
+              <a:t>Module Parameters and Prefixes</a:t>
             </a:r>
           </a:p>
         </p:txBody>
@@ -6221,7 +6257,7 @@
           <p:cNvPr id="3" name="Content Placeholder 2">
             <a:extLst>
               <a:ext uri="{FF2B5EF4-FFF2-40B4-BE49-F238E27FC236}">
-                <a16:creationId xmlns:a16="http://schemas.microsoft.com/office/drawing/2014/main" id="{70B6B830-C60D-4944-A756-D6BDDCCA6CBD}"/>
+                <a16:creationId xmlns:a16="http://schemas.microsoft.com/office/drawing/2014/main" id="{EE8779A2-6672-44FF-9B44-7E894529F3FD}"/>
               </a:ext>
             </a:extLst>
           </p:cNvPr>
@@ -6234,8 +6270,8 @@
         </p:nvSpPr>
         <p:spPr>
           <a:xfrm>
-            <a:off x="761224" y="1556581"/>
-            <a:ext cx="8596668" cy="3880773"/>
+            <a:off x="677334" y="1330079"/>
+            <a:ext cx="10303855" cy="4918321"/>
           </a:xfrm>
         </p:spPr>
         <p:txBody>
@@ -6246,77 +6282,190 @@
           <a:p>
             <a:r>
               <a:rPr lang="en-US" dirty="0"/>
-              <a:t>-</a:t>
+              <a:t>POSH_ADO Example:</a:t>
+            </a:r>
+          </a:p>
+          <a:p>
+            <a:endParaRPr lang="en-US" dirty="0"/>
+          </a:p>
+          <a:p>
+            <a:r>
+              <a:rPr lang="en-US" dirty="0"/>
+              <a:t>At the top of the posh_ado.psm1 file</a:t>
+            </a:r>
+          </a:p>
+          <a:p>
+            <a:pPr marL="0" indent="0">
+              <a:buNone/>
+            </a:pPr>
+            <a:r>
+              <a:rPr lang="en-US" dirty="0"/>
+              <a:t>param([parameter(Mandatory=$true,</a:t>
+            </a:r>
+          </a:p>
+          <a:p>
+            <a:pPr marL="0" indent="0">
+              <a:buNone/>
+            </a:pPr>
+            <a:r>
+              <a:rPr lang="en-US" dirty="0"/>
+              <a:t>                 </a:t>
             </a:r>
             <a:r>
               <a:rPr lang="en-US" dirty="0" err="1"/>
-              <a:t>AsCustomObject</a:t>
-            </a:r>
-            <a:endParaRPr lang="en-US" dirty="0"/>
-          </a:p>
-          <a:p>
-            <a:endParaRPr lang="en-US" dirty="0"/>
-          </a:p>
-          <a:p>
-            <a:r>
-              <a:rPr lang="en-US" dirty="0"/>
-              <a:t>Instead of importing variables and functions into the scope, it creates an object with properties and methods</a:t>
-            </a:r>
-          </a:p>
-          <a:p>
-            <a:r>
-              <a:rPr lang="en-US" dirty="0"/>
-              <a:t>Mapping PowerShell parameters onto method parameters is not a good prize</a:t>
-            </a:r>
-          </a:p>
-          <a:p>
-            <a:r>
-              <a:rPr lang="en-US" dirty="0"/>
-              <a:t>And </a:t>
+              <a:t>HelpMessage</a:t>
+            </a:r>
+            <a:r>
+              <a:rPr lang="en-US" dirty="0"/>
+              <a:t>="The name of the ADO.NET provider to import the module for.")]</a:t>
+            </a:r>
+          </a:p>
+          <a:p>
+            <a:pPr marL="0" indent="0">
+              <a:buNone/>
+            </a:pPr>
+            <a:r>
+              <a:rPr lang="en-US" dirty="0"/>
+              <a:t>                 $</a:t>
             </a:r>
             <a:r>
               <a:rPr lang="en-US" dirty="0" err="1"/>
-              <a:t>parametersets</a:t>
-            </a:r>
-            <a:r>
-              <a:rPr lang="en-US" dirty="0"/>
-              <a:t> don’t work.</a:t>
-            </a:r>
-          </a:p>
-          <a:p>
-            <a:r>
-              <a:rPr lang="en-US" dirty="0"/>
-              <a:t>Also, method names and dashes are not a good fit.</a:t>
-            </a:r>
-          </a:p>
-          <a:p>
-            <a:r>
-              <a:rPr lang="en-US" dirty="0"/>
-              <a:t>And…aliases are broken.</a:t>
-            </a:r>
-          </a:p>
-          <a:p>
-            <a:r>
-              <a:rPr lang="en-US" dirty="0"/>
-              <a:t>However, it does work in its own charming way</a:t>
-            </a:r>
-          </a:p>
-          <a:p>
-            <a:endParaRPr lang="en-US" dirty="0"/>
-          </a:p>
-          <a:p>
-            <a:r>
-              <a:rPr lang="en-US" dirty="0">
-                <a:hlinkClick r:id="rId2"/>
-              </a:rPr>
-              <a:t>https://powershellstation.com/2012/02/08/importing-modules-using-ascustomobject/</a:t>
-            </a:r>
-            <a:endParaRPr lang="en-US" dirty="0"/>
-          </a:p>
-          <a:p>
-            <a:endParaRPr lang="en-US" dirty="0"/>
-          </a:p>
-          <a:p>
+              <a:t>ADONETProvider</a:t>
+            </a:r>
+            <a:r>
+              <a:rPr lang="en-US" dirty="0"/>
+              <a:t>)</a:t>
+            </a:r>
+          </a:p>
+          <a:p>
+            <a:pPr marL="0" indent="0">
+              <a:buNone/>
+            </a:pPr>
+            <a:endParaRPr lang="en-US" dirty="0"/>
+          </a:p>
+          <a:p>
+            <a:pPr marL="0" indent="0">
+              <a:buNone/>
+            </a:pPr>
+            <a:r>
+              <a:rPr lang="en-US" dirty="0"/>
+              <a:t># Load the named ADO.NET provider</a:t>
+            </a:r>
+          </a:p>
+          <a:p>
+            <a:pPr marL="0" indent="0">
+              <a:buNone/>
+            </a:pPr>
+            <a:r>
+              <a:rPr lang="en-US" dirty="0"/>
+              <a:t>$provider=[</a:t>
+            </a:r>
+            <a:r>
+              <a:rPr lang="en-US" dirty="0" err="1"/>
+              <a:t>System.Data.Common.DbProviderFactories</a:t>
+            </a:r>
+            <a:r>
+              <a:rPr lang="en-US" dirty="0"/>
+              <a:t>]::</a:t>
+            </a:r>
+            <a:r>
+              <a:rPr lang="en-US" dirty="0" err="1"/>
+              <a:t>GetFactory</a:t>
+            </a:r>
+            <a:r>
+              <a:rPr lang="en-US" dirty="0"/>
+              <a:t>($</a:t>
+            </a:r>
+            <a:r>
+              <a:rPr lang="en-US" dirty="0" err="1"/>
+              <a:t>ADONETProvider</a:t>
+            </a:r>
+            <a:r>
+              <a:rPr lang="en-US" dirty="0"/>
+              <a:t>) </a:t>
+            </a:r>
+          </a:p>
+          <a:p>
+            <a:endParaRPr lang="en-US" dirty="0"/>
+          </a:p>
+          <a:p>
+            <a:r>
+              <a:rPr lang="en-US" dirty="0"/>
+              <a:t>Then, in </a:t>
+            </a:r>
+            <a:r>
+              <a:rPr lang="en-US" dirty="0" err="1"/>
+              <a:t>Posh_Ado_SQLServer</a:t>
+            </a:r>
+            <a:endParaRPr lang="en-US" dirty="0"/>
+          </a:p>
+          <a:p>
+            <a:pPr marL="0" indent="0">
+              <a:buNone/>
+            </a:pPr>
+            <a:r>
+              <a:rPr lang="en-US" dirty="0"/>
+              <a:t>import-module </a:t>
+            </a:r>
+            <a:r>
+              <a:rPr lang="en-US" dirty="0" err="1"/>
+              <a:t>POSH_Ado</a:t>
+            </a:r>
+            <a:r>
+              <a:rPr lang="en-US" dirty="0"/>
+              <a:t> -</a:t>
+            </a:r>
+            <a:r>
+              <a:rPr lang="en-US" dirty="0" err="1"/>
+              <a:t>args</a:t>
+            </a:r>
+            <a:r>
+              <a:rPr lang="en-US" dirty="0"/>
+              <a:t> </a:t>
+            </a:r>
+            <a:r>
+              <a:rPr lang="en-US" dirty="0" err="1"/>
+              <a:t>System.Data.SqlClient</a:t>
+            </a:r>
+            <a:r>
+              <a:rPr lang="en-US" dirty="0"/>
+              <a:t> -Prefix </a:t>
+            </a:r>
+            <a:r>
+              <a:rPr lang="en-US" dirty="0" err="1"/>
+              <a:t>SQLServer</a:t>
+            </a:r>
+            <a:r>
+              <a:rPr lang="en-US" dirty="0"/>
+              <a:t> –force</a:t>
+            </a:r>
+          </a:p>
+          <a:p>
+            <a:pPr marL="0" indent="0">
+              <a:buNone/>
+            </a:pPr>
+            <a:endParaRPr lang="en-US" dirty="0"/>
+          </a:p>
+          <a:p>
+            <a:pPr marL="0" indent="0">
+              <a:buNone/>
+            </a:pPr>
+            <a:r>
+              <a:rPr lang="en-US" dirty="0"/>
+              <a:t>Imports the “base” module, passing a parameter and prefixing the </a:t>
+            </a:r>
+            <a:r>
+              <a:rPr lang="en-US"/>
+              <a:t>imported function nouns </a:t>
+            </a:r>
+            <a:r>
+              <a:rPr lang="en-US" dirty="0"/>
+              <a:t>with </a:t>
+            </a:r>
+            <a:r>
+              <a:rPr lang="en-US" dirty="0" err="1"/>
+              <a:t>SQLServer</a:t>
+            </a:r>
             <a:endParaRPr lang="en-US" dirty="0"/>
           </a:p>
         </p:txBody>
@@ -6324,7 +6473,7 @@
     </p:spTree>
     <p:extLst>
       <p:ext uri="{BB962C8B-B14F-4D97-AF65-F5344CB8AC3E}">
-        <p14:creationId xmlns:p14="http://schemas.microsoft.com/office/powerpoint/2010/main" val="2629278362"/>
+        <p14:creationId xmlns:p14="http://schemas.microsoft.com/office/powerpoint/2010/main" val="4244654342"/>
       </p:ext>
     </p:extLst>
   </p:cSld>
@@ -6356,7 +6505,7 @@
           <p:cNvPr id="2" name="Title 1">
             <a:extLst>
               <a:ext uri="{FF2B5EF4-FFF2-40B4-BE49-F238E27FC236}">
-                <a16:creationId xmlns:a16="http://schemas.microsoft.com/office/drawing/2014/main" id="{1736F393-2DBE-47FA-B330-50253DC56CB7}"/>
+                <a16:creationId xmlns:a16="http://schemas.microsoft.com/office/drawing/2014/main" id="{138F4842-DD1A-4298-ACF3-487B025DDF1B}"/>
               </a:ext>
             </a:extLst>
           </p:cNvPr>
@@ -6367,19 +6516,14 @@
             <p:ph type="title"/>
           </p:nvPr>
         </p:nvSpPr>
-        <p:spPr>
-          <a:xfrm>
-            <a:off x="677334" y="609600"/>
-            <a:ext cx="8596668" cy="841695"/>
-          </a:xfrm>
-        </p:spPr>
-        <p:txBody>
-          <a:bodyPr/>
-          <a:lstStyle/>
-          <a:p>
-            <a:r>
-              <a:rPr lang="en-US" dirty="0"/>
-              <a:t>Module Parameters and Prefixes</a:t>
+        <p:spPr/>
+        <p:txBody>
+          <a:bodyPr/>
+          <a:lstStyle/>
+          <a:p>
+            <a:r>
+              <a:rPr lang="en-US" dirty="0"/>
+              <a:t>Multiple versions of a module</a:t>
             </a:r>
           </a:p>
         </p:txBody>
@@ -6389,7 +6533,7 @@
           <p:cNvPr id="3" name="Content Placeholder 2">
             <a:extLst>
               <a:ext uri="{FF2B5EF4-FFF2-40B4-BE49-F238E27FC236}">
-                <a16:creationId xmlns:a16="http://schemas.microsoft.com/office/drawing/2014/main" id="{EE8779A2-6672-44FF-9B44-7E894529F3FD}"/>
+                <a16:creationId xmlns:a16="http://schemas.microsoft.com/office/drawing/2014/main" id="{4C02FD71-A46F-47FD-B3AB-D1201E76CD67}"/>
               </a:ext>
             </a:extLst>
           </p:cNvPr>
@@ -6402,210 +6546,31 @@
         </p:nvSpPr>
         <p:spPr>
           <a:xfrm>
-            <a:off x="677334" y="1330079"/>
-            <a:ext cx="10303855" cy="4918321"/>
+            <a:off x="243281" y="2160589"/>
+            <a:ext cx="10108733" cy="3880773"/>
           </a:xfrm>
         </p:spPr>
         <p:txBody>
-          <a:bodyPr>
-            <a:normAutofit fontScale="92500" lnSpcReduction="20000"/>
-          </a:bodyPr>
-          <a:lstStyle/>
-          <a:p>
-            <a:r>
-              <a:rPr lang="en-US" dirty="0"/>
-              <a:t>POSH_ADO Example:</a:t>
-            </a:r>
-          </a:p>
-          <a:p>
-            <a:endParaRPr lang="en-US" dirty="0"/>
-          </a:p>
-          <a:p>
-            <a:r>
-              <a:rPr lang="en-US" dirty="0"/>
-              <a:t>At the top of the posh_ado.psm1 file</a:t>
-            </a:r>
-          </a:p>
-          <a:p>
-            <a:pPr marL="0" indent="0">
-              <a:buNone/>
-            </a:pPr>
-            <a:r>
-              <a:rPr lang="en-US" dirty="0"/>
-              <a:t>param([parameter(Mandatory=$true,</a:t>
-            </a:r>
-          </a:p>
-          <a:p>
-            <a:pPr marL="0" indent="0">
-              <a:buNone/>
-            </a:pPr>
-            <a:r>
-              <a:rPr lang="en-US" dirty="0"/>
-              <a:t>                 </a:t>
-            </a:r>
-            <a:r>
-              <a:rPr lang="en-US" dirty="0" err="1"/>
-              <a:t>HelpMessage</a:t>
-            </a:r>
-            <a:r>
-              <a:rPr lang="en-US" dirty="0"/>
-              <a:t>="The name of the ADO.NET provider to import the module for.")]</a:t>
-            </a:r>
-          </a:p>
-          <a:p>
-            <a:pPr marL="0" indent="0">
-              <a:buNone/>
-            </a:pPr>
-            <a:r>
-              <a:rPr lang="en-US" dirty="0"/>
-              <a:t>                 $</a:t>
-            </a:r>
-            <a:r>
-              <a:rPr lang="en-US" dirty="0" err="1"/>
-              <a:t>ADONETProvider</a:t>
-            </a:r>
-            <a:r>
-              <a:rPr lang="en-US" dirty="0"/>
-              <a:t>)</a:t>
-            </a:r>
-          </a:p>
-          <a:p>
-            <a:pPr marL="0" indent="0">
-              <a:buNone/>
-            </a:pPr>
-            <a:endParaRPr lang="en-US" dirty="0"/>
-          </a:p>
-          <a:p>
-            <a:pPr marL="0" indent="0">
-              <a:buNone/>
-            </a:pPr>
-            <a:r>
-              <a:rPr lang="en-US" dirty="0"/>
-              <a:t># Load the named ADO.NET provider</a:t>
-            </a:r>
-          </a:p>
-          <a:p>
-            <a:pPr marL="0" indent="0">
-              <a:buNone/>
-            </a:pPr>
-            <a:r>
-              <a:rPr lang="en-US" dirty="0"/>
-              <a:t>$provider=[</a:t>
-            </a:r>
-            <a:r>
-              <a:rPr lang="en-US" dirty="0" err="1"/>
-              <a:t>System.Data.Common.DbProviderFactories</a:t>
-            </a:r>
-            <a:r>
-              <a:rPr lang="en-US" dirty="0"/>
-              <a:t>]::</a:t>
-            </a:r>
-            <a:r>
-              <a:rPr lang="en-US" dirty="0" err="1"/>
-              <a:t>GetFactory</a:t>
-            </a:r>
-            <a:r>
-              <a:rPr lang="en-US" dirty="0"/>
-              <a:t>($</a:t>
-            </a:r>
-            <a:r>
-              <a:rPr lang="en-US" dirty="0" err="1"/>
-              <a:t>ADONETProvider</a:t>
-            </a:r>
-            <a:r>
-              <a:rPr lang="en-US" dirty="0"/>
-              <a:t>) </a:t>
-            </a:r>
-          </a:p>
-          <a:p>
-            <a:endParaRPr lang="en-US" dirty="0"/>
-          </a:p>
-          <a:p>
-            <a:r>
-              <a:rPr lang="en-US" dirty="0"/>
-              <a:t>Then, in </a:t>
-            </a:r>
-            <a:r>
-              <a:rPr lang="en-US" dirty="0" err="1"/>
-              <a:t>Posh_Ado_SQLServer</a:t>
-            </a:r>
-            <a:endParaRPr lang="en-US" dirty="0"/>
-          </a:p>
-          <a:p>
-            <a:pPr marL="0" indent="0">
-              <a:buNone/>
-            </a:pPr>
-            <a:r>
-              <a:rPr lang="en-US" dirty="0"/>
-              <a:t>import-module </a:t>
-            </a:r>
-            <a:r>
-              <a:rPr lang="en-US" dirty="0" err="1"/>
-              <a:t>POSH_Ado</a:t>
-            </a:r>
-            <a:r>
-              <a:rPr lang="en-US" dirty="0"/>
-              <a:t> -</a:t>
-            </a:r>
-            <a:r>
-              <a:rPr lang="en-US" dirty="0" err="1"/>
-              <a:t>args</a:t>
-            </a:r>
-            <a:r>
-              <a:rPr lang="en-US" dirty="0"/>
-              <a:t> </a:t>
-            </a:r>
-            <a:r>
-              <a:rPr lang="en-US" dirty="0" err="1"/>
-              <a:t>System.Data.SqlClient</a:t>
-            </a:r>
-            <a:r>
-              <a:rPr lang="en-US" dirty="0"/>
-              <a:t> -Prefix </a:t>
-            </a:r>
-            <a:r>
-              <a:rPr lang="en-US" dirty="0" err="1"/>
-              <a:t>SQLServer</a:t>
-            </a:r>
-            <a:r>
-              <a:rPr lang="en-US" dirty="0"/>
-              <a:t> –force</a:t>
-            </a:r>
-          </a:p>
-          <a:p>
-            <a:pPr marL="0" indent="0">
-              <a:buNone/>
-            </a:pPr>
-            <a:endParaRPr lang="en-US" dirty="0"/>
-          </a:p>
-          <a:p>
-            <a:pPr marL="0" indent="0">
-              <a:buNone/>
-            </a:pPr>
-            <a:r>
-              <a:rPr lang="en-US" dirty="0"/>
-              <a:t>Imports the “base” module, passing a parameter and prefixing the </a:t>
-            </a:r>
-            <a:r>
-              <a:rPr lang="en-US"/>
-              <a:t>imported function nouns </a:t>
-            </a:r>
-            <a:r>
-              <a:rPr lang="en-US" dirty="0"/>
-              <a:t>with </a:t>
-            </a:r>
-            <a:r>
-              <a:rPr lang="en-US" dirty="0" err="1"/>
-              <a:t>SQLServer</a:t>
-            </a:r>
-            <a:endParaRPr lang="en-US" dirty="0"/>
+          <a:bodyPr/>
+          <a:lstStyle/>
+          <a:p>
+            <a:r>
+              <a:rPr lang="en-US" dirty="0"/>
+              <a:t>You can add a version directory to your module folder if you want to have multiple versions of the same module</a:t>
+            </a:r>
+          </a:p>
+          <a:p>
+            <a:r>
+              <a:rPr lang="en-US" dirty="0"/>
+              <a:t>You must use a module manifest (and match the version in the manifest to the directory)</a:t>
+            </a:r>
           </a:p>
         </p:txBody>
       </p:sp>
     </p:spTree>
     <p:extLst>
       <p:ext uri="{BB962C8B-B14F-4D97-AF65-F5344CB8AC3E}">
-        <p14:creationId xmlns:p14="http://schemas.microsoft.com/office/powerpoint/2010/main" val="4244654342"/>
+        <p14:creationId xmlns:p14="http://schemas.microsoft.com/office/powerpoint/2010/main" val="3145664923"/>
       </p:ext>
     </p:extLst>
   </p:cSld>
@@ -6637,7 +6602,7 @@
           <p:cNvPr id="2" name="Title 1">
             <a:extLst>
               <a:ext uri="{FF2B5EF4-FFF2-40B4-BE49-F238E27FC236}">
-                <a16:creationId xmlns:a16="http://schemas.microsoft.com/office/drawing/2014/main" id="{138F4842-DD1A-4298-ACF3-487B025DDF1B}"/>
+                <a16:creationId xmlns:a16="http://schemas.microsoft.com/office/drawing/2014/main" id="{F082882C-003A-445D-920D-2C87F7680D47}"/>
               </a:ext>
             </a:extLst>
           </p:cNvPr>
@@ -6655,8 +6620,12 @@
           <a:p>
             <a:r>
               <a:rPr lang="en-US" dirty="0"/>
-              <a:t>Multiple versions of a module</a:t>
-            </a:r>
+              <a:t>Other ways to import modules</a:t>
+            </a:r>
+            <a:br>
+              <a:rPr lang="en-US" dirty="0"/>
+            </a:br>
+            <a:endParaRPr lang="en-US" dirty="0"/>
           </a:p>
         </p:txBody>
       </p:sp>
@@ -6665,7 +6634,7 @@
           <p:cNvPr id="3" name="Content Placeholder 2">
             <a:extLst>
               <a:ext uri="{FF2B5EF4-FFF2-40B4-BE49-F238E27FC236}">
-                <a16:creationId xmlns:a16="http://schemas.microsoft.com/office/drawing/2014/main" id="{4C02FD71-A46F-47FD-B3AB-D1201E76CD67}"/>
+                <a16:creationId xmlns:a16="http://schemas.microsoft.com/office/drawing/2014/main" id="{8A16DA8B-A8DD-4055-8BB8-499852E5562F}"/>
               </a:ext>
             </a:extLst>
           </p:cNvPr>
@@ -6678,8 +6647,8 @@
         </p:nvSpPr>
         <p:spPr>
           <a:xfrm>
-            <a:off x="243281" y="2160589"/>
-            <a:ext cx="10108733" cy="3880773"/>
+            <a:off x="677334" y="1488613"/>
+            <a:ext cx="8596668" cy="3880773"/>
           </a:xfrm>
         </p:spPr>
         <p:txBody>
@@ -6688,21 +6657,102 @@
           <a:p>
             <a:r>
               <a:rPr lang="en-US" dirty="0"/>
-              <a:t>You can add a version directory to your module folder if you want to have multiple versions of the same module</a:t>
-            </a:r>
-          </a:p>
-          <a:p>
-            <a:r>
-              <a:rPr lang="en-US" dirty="0"/>
-              <a:t>You must use a module manifest (and match the version in the manifest to the directory)</a:t>
-            </a:r>
+              <a:t>#Requires –Modules &lt;</a:t>
+            </a:r>
+            <a:r>
+              <a:rPr lang="en-US" dirty="0" err="1"/>
+              <a:t>modulename</a:t>
+            </a:r>
+            <a:r>
+              <a:rPr lang="en-US" dirty="0"/>
+              <a:t>&gt;</a:t>
+            </a:r>
+          </a:p>
+          <a:p>
+            <a:pPr lvl="1"/>
+            <a:r>
+              <a:rPr lang="en-US" dirty="0"/>
+              <a:t>Prevents a script from running unless the module is available and able to be imported</a:t>
+            </a:r>
+          </a:p>
+          <a:p>
+            <a:pPr lvl="1"/>
+            <a:r>
+              <a:rPr lang="en-US" dirty="0"/>
+              <a:t>Can use a </a:t>
+            </a:r>
+            <a:r>
+              <a:rPr lang="en-US" dirty="0" err="1"/>
+              <a:t>hashtable</a:t>
+            </a:r>
+            <a:r>
+              <a:rPr lang="en-US" dirty="0"/>
+              <a:t> with </a:t>
+            </a:r>
+            <a:r>
+              <a:rPr lang="en-US" dirty="0" err="1"/>
+              <a:t>ModuleName</a:t>
+            </a:r>
+            <a:r>
+              <a:rPr lang="en-US" dirty="0"/>
+              <a:t> and </a:t>
+            </a:r>
+            <a:r>
+              <a:rPr lang="en-US" dirty="0" err="1"/>
+              <a:t>ModuleVersion</a:t>
+            </a:r>
+            <a:r>
+              <a:rPr lang="en-US" dirty="0"/>
+              <a:t> (optional GUID)</a:t>
+            </a:r>
+          </a:p>
+          <a:p>
+            <a:r>
+              <a:rPr lang="en-US" dirty="0"/>
+              <a:t>Using module &lt;</a:t>
+            </a:r>
+            <a:r>
+              <a:rPr lang="en-US" dirty="0" err="1"/>
+              <a:t>modulename</a:t>
+            </a:r>
+            <a:r>
+              <a:rPr lang="en-US" dirty="0"/>
+              <a:t>&gt;</a:t>
+            </a:r>
+          </a:p>
+          <a:p>
+            <a:pPr lvl="1"/>
+            <a:r>
+              <a:rPr lang="en-US" dirty="0"/>
+              <a:t>If you want to expose PowerShell classes (and </a:t>
+            </a:r>
+            <a:r>
+              <a:rPr lang="en-US" dirty="0" err="1"/>
+              <a:t>enums</a:t>
+            </a:r>
+            <a:r>
+              <a:rPr lang="en-US" dirty="0"/>
+              <a:t>?) that are in a module, you </a:t>
+            </a:r>
+            <a:r>
+              <a:rPr lang="en-US" u="sng" dirty="0"/>
+              <a:t>must</a:t>
+            </a:r>
+            <a:r>
+              <a:rPr lang="en-US" dirty="0"/>
+              <a:t> use the using statement to import the module.</a:t>
+            </a:r>
+          </a:p>
+          <a:p>
+            <a:pPr lvl="1"/>
+            <a:endParaRPr lang="en-US" dirty="0"/>
           </a:p>
         </p:txBody>
       </p:sp>
     </p:spTree>
     <p:extLst>
       <p:ext uri="{BB962C8B-B14F-4D97-AF65-F5344CB8AC3E}">
-        <p14:creationId xmlns:p14="http://schemas.microsoft.com/office/powerpoint/2010/main" val="3145664923"/>
+        <p14:creationId xmlns:p14="http://schemas.microsoft.com/office/powerpoint/2010/main" val="3546995980"/>
       </p:ext>
     </p:extLst>
   </p:cSld>
@@ -6734,7 +6784,7 @@
           <p:cNvPr id="2" name="Title 1">
             <a:extLst>
               <a:ext uri="{FF2B5EF4-FFF2-40B4-BE49-F238E27FC236}">
-                <a16:creationId xmlns:a16="http://schemas.microsoft.com/office/drawing/2014/main" id="{F082882C-003A-445D-920D-2C87F7680D47}"/>
+                <a16:creationId xmlns:a16="http://schemas.microsoft.com/office/drawing/2014/main" id="{65503A76-1198-471A-BFE7-84D78361C3F7}"/>
               </a:ext>
             </a:extLst>
           </p:cNvPr>
@@ -6752,12 +6802,8 @@
           <a:p>
             <a:r>
               <a:rPr lang="en-US" dirty="0"/>
-              <a:t>Other ways to import modules</a:t>
-            </a:r>
-            <a:br>
-              <a:rPr lang="en-US" dirty="0"/>
-            </a:br>
-            <a:endParaRPr lang="en-US" dirty="0"/>
+              <a:t>Module “Tooling”</a:t>
+            </a:r>
           </a:p>
         </p:txBody>
       </p:sp>
@@ -6766,7 +6812,7 @@
           <p:cNvPr id="3" name="Content Placeholder 2">
             <a:extLst>
               <a:ext uri="{FF2B5EF4-FFF2-40B4-BE49-F238E27FC236}">
-                <a16:creationId xmlns:a16="http://schemas.microsoft.com/office/drawing/2014/main" id="{8A16DA8B-A8DD-4055-8BB8-499852E5562F}"/>
+                <a16:creationId xmlns:a16="http://schemas.microsoft.com/office/drawing/2014/main" id="{9C5AF03C-D751-4960-99E8-8B3D962868CF}"/>
               </a:ext>
             </a:extLst>
           </p:cNvPr>
@@ -6777,106 +6823,48 @@
             <p:ph idx="1"/>
           </p:nvPr>
         </p:nvSpPr>
-        <p:spPr>
-          <a:xfrm>
-            <a:off x="677334" y="1488613"/>
-            <a:ext cx="8596668" cy="3880773"/>
-          </a:xfrm>
-        </p:spPr>
-        <p:txBody>
-          <a:bodyPr/>
-          <a:lstStyle/>
-          <a:p>
-            <a:r>
-              <a:rPr lang="en-US" dirty="0"/>
-              <a:t>#Requires –Modules &lt;</a:t>
-            </a:r>
+        <p:spPr/>
+        <p:txBody>
+          <a:bodyPr/>
+          <a:lstStyle/>
+          <a:p>
             <a:r>
               <a:rPr lang="en-US" dirty="0" err="1"/>
-              <a:t>modulename</a:t>
-            </a:r>
-            <a:r>
-              <a:rPr lang="en-US" dirty="0"/>
-              <a:t>&gt;</a:t>
-            </a:r>
-          </a:p>
-          <a:p>
-            <a:pPr lvl="1"/>
-            <a:r>
-              <a:rPr lang="en-US" dirty="0"/>
-              <a:t>Prevents a script from running unless the module is available and able to be imported</a:t>
-            </a:r>
-          </a:p>
-          <a:p>
-            <a:pPr lvl="1"/>
-            <a:r>
-              <a:rPr lang="en-US" dirty="0"/>
-              <a:t>Can use a </a:t>
-            </a:r>
+              <a:t>Psake</a:t>
+            </a:r>
+            <a:endParaRPr lang="en-US" dirty="0"/>
+          </a:p>
+          <a:p>
             <a:r>
               <a:rPr lang="en-US" dirty="0" err="1"/>
-              <a:t>hashtable</a:t>
-            </a:r>
-            <a:r>
-              <a:rPr lang="en-US" dirty="0"/>
-              <a:t> with </a:t>
-            </a:r>
+              <a:t>Platyps</a:t>
+            </a:r>
+            <a:endParaRPr lang="en-US" dirty="0"/>
+          </a:p>
+          <a:p>
+            <a:r>
+              <a:rPr lang="en-US" dirty="0"/>
+              <a:t>Plaster</a:t>
+            </a:r>
+          </a:p>
+          <a:p>
+            <a:r>
+              <a:rPr lang="en-US" dirty="0"/>
+              <a:t>Pester</a:t>
+            </a:r>
+          </a:p>
+          <a:p>
             <a:r>
               <a:rPr lang="en-US" dirty="0" err="1"/>
-              <a:t>ModuleName</a:t>
-            </a:r>
-            <a:r>
-              <a:rPr lang="en-US" dirty="0"/>
-              <a:t> and </a:t>
-            </a:r>
+              <a:t>BuildHelpers</a:t>
+            </a:r>
+            <a:endParaRPr lang="en-US" dirty="0"/>
+          </a:p>
+          <a:p>
             <a:r>
               <a:rPr lang="en-US" dirty="0" err="1"/>
-              <a:t>ModuleVersion</a:t>
-            </a:r>
-            <a:r>
-              <a:rPr lang="en-US" dirty="0"/>
-              <a:t> (optional GUID)</a:t>
-            </a:r>
-          </a:p>
-          <a:p>
-            <a:r>
-              <a:rPr lang="en-US" dirty="0"/>
-              <a:t>Using module &lt;</a:t>
-            </a:r>
-            <a:r>
-              <a:rPr lang="en-US" dirty="0" err="1"/>
-              <a:t>modulename</a:t>
-            </a:r>
-            <a:r>
-              <a:rPr lang="en-US" dirty="0"/>
-              <a:t>&gt;</a:t>
-            </a:r>
-          </a:p>
-          <a:p>
-            <a:pPr lvl="1"/>
-            <a:r>
-              <a:rPr lang="en-US" dirty="0"/>
-              <a:t>If you want to expose PowerShell classes (and </a:t>
-            </a:r>
-            <a:r>
-              <a:rPr lang="en-US" dirty="0" err="1"/>
-              <a:t>enums</a:t>
-            </a:r>
-            <a:r>
-              <a:rPr lang="en-US" dirty="0"/>
-              <a:t>?) that are in a module, you </a:t>
-            </a:r>
-            <a:r>
-              <a:rPr lang="en-US" u="sng" dirty="0"/>
-              <a:t>must</a:t>
-            </a:r>
-            <a:r>
-              <a:rPr lang="en-US" dirty="0"/>
-              <a:t> use the using statement to import the module.</a:t>
-            </a:r>
-          </a:p>
-          <a:p>
-            <a:pPr lvl="1"/>
+              <a:t>PSDeploy</a:t>
+            </a:r>
             <a:endParaRPr lang="en-US" dirty="0"/>
           </a:p>
         </p:txBody>
@@ -6884,7 +6872,473 @@
     </p:spTree>
     <p:extLst>
       <p:ext uri="{BB962C8B-B14F-4D97-AF65-F5344CB8AC3E}">
-        <p14:creationId xmlns:p14="http://schemas.microsoft.com/office/powerpoint/2010/main" val="3546995980"/>
+        <p14:creationId xmlns:p14="http://schemas.microsoft.com/office/powerpoint/2010/main" val="887347029"/>
+      </p:ext>
+    </p:extLst>
+  </p:cSld>
+  <p:clrMapOvr>
+    <a:masterClrMapping/>
+  </p:clrMapOvr>
+</p:sld>
+</file>
+
+<file path=ppt/slides/slide16.xml><?xml version="1.0" encoding="utf-8"?>
+<p:sld xmlns:a="http://schemas.openxmlformats.org/drawingml/2006/main" xmlns:r="http://schemas.openxmlformats.org/officeDocument/2006/relationships" xmlns:p="http://schemas.openxmlformats.org/presentationml/2006/main">
+  <p:cSld>
+    <p:spTree>
+      <p:nvGrpSpPr>
+        <p:cNvPr id="1" name=""/>
+        <p:cNvGrpSpPr/>
+        <p:nvPr/>
+      </p:nvGrpSpPr>
+      <p:grpSpPr>
+        <a:xfrm>
+          <a:off x="0" y="0"/>
+          <a:ext cx="0" cy="0"/>
+          <a:chOff x="0" y="0"/>
+          <a:chExt cx="0" cy="0"/>
+        </a:xfrm>
+      </p:grpSpPr>
+      <p:sp>
+        <p:nvSpPr>
+          <p:cNvPr id="2" name="Title 1">
+            <a:extLst>
+              <a:ext uri="{FF2B5EF4-FFF2-40B4-BE49-F238E27FC236}">
+                <a16:creationId xmlns:a16="http://schemas.microsoft.com/office/drawing/2014/main" id="{08BA03AD-D8F1-446A-8095-436563759101}"/>
+              </a:ext>
+            </a:extLst>
+          </p:cNvPr>
+          <p:cNvSpPr>
+            <a:spLocks noGrp="1"/>
+          </p:cNvSpPr>
+          <p:nvPr>
+            <p:ph type="title"/>
+          </p:nvPr>
+        </p:nvSpPr>
+        <p:spPr/>
+        <p:txBody>
+          <a:bodyPr/>
+          <a:lstStyle/>
+          <a:p>
+            <a:r>
+              <a:rPr lang="en-US" dirty="0" err="1"/>
+              <a:t>PSake</a:t>
+            </a:r>
+            <a:endParaRPr lang="en-US" dirty="0"/>
+          </a:p>
+        </p:txBody>
+      </p:sp>
+      <p:sp>
+        <p:nvSpPr>
+          <p:cNvPr id="3" name="Content Placeholder 2">
+            <a:extLst>
+              <a:ext uri="{FF2B5EF4-FFF2-40B4-BE49-F238E27FC236}">
+                <a16:creationId xmlns:a16="http://schemas.microsoft.com/office/drawing/2014/main" id="{F4A41752-0B43-4A5B-8D9D-56509EFD3164}"/>
+              </a:ext>
+            </a:extLst>
+          </p:cNvPr>
+          <p:cNvSpPr>
+            <a:spLocks noGrp="1"/>
+          </p:cNvSpPr>
+          <p:nvPr>
+            <p:ph idx="1"/>
+          </p:nvPr>
+        </p:nvSpPr>
+        <p:spPr/>
+        <p:txBody>
+          <a:bodyPr/>
+          <a:lstStyle/>
+          <a:p>
+            <a:r>
+              <a:rPr lang="en-US" dirty="0"/>
+              <a:t>PowerShell-based build engine</a:t>
+            </a:r>
+          </a:p>
+          <a:p>
+            <a:r>
+              <a:rPr lang="en-US" dirty="0"/>
+              <a:t>Uses a DSL</a:t>
+            </a:r>
+          </a:p>
+          <a:p>
+            <a:pPr marL="0" indent="0">
+              <a:buNone/>
+            </a:pPr>
+            <a:r>
+              <a:rPr lang="en-US" dirty="0"/>
+              <a:t>Task A –Depends B {</a:t>
+            </a:r>
+          </a:p>
+          <a:p>
+            <a:pPr marL="0" indent="0">
+              <a:buNone/>
+            </a:pPr>
+            <a:r>
+              <a:rPr lang="en-US" dirty="0"/>
+              <a:t>    #do A stuff, but </a:t>
+            </a:r>
+            <a:r>
+              <a:rPr lang="en-US" dirty="0" err="1"/>
+              <a:t>Psake</a:t>
+            </a:r>
+            <a:r>
+              <a:rPr lang="en-US" dirty="0"/>
+              <a:t> will make sure B stuff is done first</a:t>
+            </a:r>
+          </a:p>
+          <a:p>
+            <a:pPr marL="0" indent="0">
+              <a:buNone/>
+            </a:pPr>
+            <a:r>
+              <a:rPr lang="en-US" dirty="0"/>
+              <a:t>}</a:t>
+            </a:r>
+          </a:p>
+          <a:p>
+            <a:pPr marL="0" indent="0">
+              <a:buNone/>
+            </a:pPr>
+            <a:endParaRPr lang="en-US" dirty="0"/>
+          </a:p>
+          <a:p>
+            <a:r>
+              <a:rPr lang="en-US" dirty="0"/>
+              <a:t>Not specifically build/deploy related, but usually used that way.</a:t>
+            </a:r>
+          </a:p>
+          <a:p>
+            <a:endParaRPr lang="en-US" dirty="0"/>
+          </a:p>
+          <a:p>
+            <a:r>
+              <a:rPr lang="en-US" dirty="0"/>
+              <a:t>https://github.com/psake/psake</a:t>
+            </a:r>
+          </a:p>
+        </p:txBody>
+      </p:sp>
+    </p:spTree>
+    <p:extLst>
+      <p:ext uri="{BB962C8B-B14F-4D97-AF65-F5344CB8AC3E}">
+        <p14:creationId xmlns:p14="http://schemas.microsoft.com/office/powerpoint/2010/main" val="866383775"/>
+      </p:ext>
+    </p:extLst>
+  </p:cSld>
+  <p:clrMapOvr>
+    <a:masterClrMapping/>
+  </p:clrMapOvr>
+</p:sld>
+</file>
+
+<file path=ppt/slides/slide17.xml><?xml version="1.0" encoding="utf-8"?>
+<p:sld xmlns:a="http://schemas.openxmlformats.org/drawingml/2006/main" xmlns:r="http://schemas.openxmlformats.org/officeDocument/2006/relationships" xmlns:p="http://schemas.openxmlformats.org/presentationml/2006/main">
+  <p:cSld>
+    <p:spTree>
+      <p:nvGrpSpPr>
+        <p:cNvPr id="1" name=""/>
+        <p:cNvGrpSpPr/>
+        <p:nvPr/>
+      </p:nvGrpSpPr>
+      <p:grpSpPr>
+        <a:xfrm>
+          <a:off x="0" y="0"/>
+          <a:ext cx="0" cy="0"/>
+          <a:chOff x="0" y="0"/>
+          <a:chExt cx="0" cy="0"/>
+        </a:xfrm>
+      </p:grpSpPr>
+      <p:sp>
+        <p:nvSpPr>
+          <p:cNvPr id="2" name="Title 1">
+            <a:extLst>
+              <a:ext uri="{FF2B5EF4-FFF2-40B4-BE49-F238E27FC236}">
+                <a16:creationId xmlns:a16="http://schemas.microsoft.com/office/drawing/2014/main" id="{FC3BF24F-C53F-41AC-AAEB-9B43ED638881}"/>
+              </a:ext>
+            </a:extLst>
+          </p:cNvPr>
+          <p:cNvSpPr>
+            <a:spLocks noGrp="1"/>
+          </p:cNvSpPr>
+          <p:nvPr>
+            <p:ph type="title"/>
+          </p:nvPr>
+        </p:nvSpPr>
+        <p:spPr/>
+        <p:txBody>
+          <a:bodyPr/>
+          <a:lstStyle/>
+          <a:p>
+            <a:r>
+              <a:rPr lang="en-US" dirty="0" err="1"/>
+              <a:t>Platyps</a:t>
+            </a:r>
+            <a:endParaRPr lang="en-US" dirty="0"/>
+          </a:p>
+        </p:txBody>
+      </p:sp>
+      <p:sp>
+        <p:nvSpPr>
+          <p:cNvPr id="3" name="Content Placeholder 2">
+            <a:extLst>
+              <a:ext uri="{FF2B5EF4-FFF2-40B4-BE49-F238E27FC236}">
+                <a16:creationId xmlns:a16="http://schemas.microsoft.com/office/drawing/2014/main" id="{79990C02-7E25-4971-A07C-092B3C1E70F1}"/>
+              </a:ext>
+            </a:extLst>
+          </p:cNvPr>
+          <p:cNvSpPr>
+            <a:spLocks noGrp="1"/>
+          </p:cNvSpPr>
+          <p:nvPr>
+            <p:ph idx="1"/>
+          </p:nvPr>
+        </p:nvSpPr>
+        <p:spPr/>
+        <p:txBody>
+          <a:bodyPr/>
+          <a:lstStyle/>
+          <a:p>
+            <a:r>
+              <a:rPr lang="en-US" dirty="0"/>
+              <a:t>Creates markdown files for functions in a module</a:t>
+            </a:r>
+          </a:p>
+          <a:p>
+            <a:r>
+              <a:rPr lang="en-US" dirty="0"/>
+              <a:t>Also, creates external help files for a module</a:t>
+            </a:r>
+          </a:p>
+          <a:p>
+            <a:endParaRPr lang="en-US" dirty="0"/>
+          </a:p>
+          <a:p>
+            <a:r>
+              <a:rPr lang="en-US" dirty="0"/>
+              <a:t>https://github.com/PowerShell/platyPS</a:t>
+            </a:r>
+          </a:p>
+        </p:txBody>
+      </p:sp>
+    </p:spTree>
+    <p:extLst>
+      <p:ext uri="{BB962C8B-B14F-4D97-AF65-F5344CB8AC3E}">
+        <p14:creationId xmlns:p14="http://schemas.microsoft.com/office/powerpoint/2010/main" val="724260053"/>
+      </p:ext>
+    </p:extLst>
+  </p:cSld>
+  <p:clrMapOvr>
+    <a:masterClrMapping/>
+  </p:clrMapOvr>
+</p:sld>
+</file>
+
+<file path=ppt/slides/slide18.xml><?xml version="1.0" encoding="utf-8"?>
+<p:sld xmlns:a="http://schemas.openxmlformats.org/drawingml/2006/main" xmlns:r="http://schemas.openxmlformats.org/officeDocument/2006/relationships" xmlns:p="http://schemas.openxmlformats.org/presentationml/2006/main">
+  <p:cSld>
+    <p:spTree>
+      <p:nvGrpSpPr>
+        <p:cNvPr id="1" name=""/>
+        <p:cNvGrpSpPr/>
+        <p:nvPr/>
+      </p:nvGrpSpPr>
+      <p:grpSpPr>
+        <a:xfrm>
+          <a:off x="0" y="0"/>
+          <a:ext cx="0" cy="0"/>
+          <a:chOff x="0" y="0"/>
+          <a:chExt cx="0" cy="0"/>
+        </a:xfrm>
+      </p:grpSpPr>
+      <p:sp>
+        <p:nvSpPr>
+          <p:cNvPr id="2" name="Title 1">
+            <a:extLst>
+              <a:ext uri="{FF2B5EF4-FFF2-40B4-BE49-F238E27FC236}">
+                <a16:creationId xmlns:a16="http://schemas.microsoft.com/office/drawing/2014/main" id="{5B69AD3E-A8E6-4689-99A7-092DB068D762}"/>
+              </a:ext>
+            </a:extLst>
+          </p:cNvPr>
+          <p:cNvSpPr>
+            <a:spLocks noGrp="1"/>
+          </p:cNvSpPr>
+          <p:nvPr>
+            <p:ph type="title"/>
+          </p:nvPr>
+        </p:nvSpPr>
+        <p:spPr>
+          <a:xfrm>
+            <a:off x="677334" y="609600"/>
+            <a:ext cx="8596668" cy="766194"/>
+          </a:xfrm>
+        </p:spPr>
+        <p:txBody>
+          <a:bodyPr/>
+          <a:lstStyle/>
+          <a:p>
+            <a:r>
+              <a:rPr lang="en-US" dirty="0"/>
+              <a:t>Plaster</a:t>
+            </a:r>
+          </a:p>
+        </p:txBody>
+      </p:sp>
+      <p:sp>
+        <p:nvSpPr>
+          <p:cNvPr id="3" name="Content Placeholder 2">
+            <a:extLst>
+              <a:ext uri="{FF2B5EF4-FFF2-40B4-BE49-F238E27FC236}">
+                <a16:creationId xmlns:a16="http://schemas.microsoft.com/office/drawing/2014/main" id="{FC2C5D7C-79FB-4985-A8FE-0DBD0E678AC4}"/>
+              </a:ext>
+            </a:extLst>
+          </p:cNvPr>
+          <p:cNvSpPr>
+            <a:spLocks noGrp="1"/>
+          </p:cNvSpPr>
+          <p:nvPr>
+            <p:ph idx="1"/>
+          </p:nvPr>
+        </p:nvSpPr>
+        <p:spPr>
+          <a:xfrm>
+            <a:off x="677334" y="1459685"/>
+            <a:ext cx="8596668" cy="4581678"/>
+          </a:xfrm>
+        </p:spPr>
+        <p:txBody>
+          <a:bodyPr/>
+          <a:lstStyle/>
+          <a:p>
+            <a:r>
+              <a:rPr lang="en-US" dirty="0"/>
+              <a:t>Templating tool</a:t>
+            </a:r>
+          </a:p>
+          <a:p>
+            <a:r>
+              <a:rPr lang="en-US" dirty="0"/>
+              <a:t>Useful for generating “blank” modules</a:t>
+            </a:r>
+          </a:p>
+          <a:p>
+            <a:r>
+              <a:rPr lang="en-US" dirty="0"/>
+              <a:t>Uses xml template with parameters</a:t>
+            </a:r>
+          </a:p>
+          <a:p>
+            <a:r>
+              <a:rPr lang="en-US" dirty="0"/>
+              <a:t>Templates run in constrained language mode (only certain cmdlets allowed)</a:t>
+            </a:r>
+          </a:p>
+          <a:p>
+            <a:endParaRPr lang="en-US" dirty="0"/>
+          </a:p>
+          <a:p>
+            <a:r>
+              <a:rPr lang="en-US" dirty="0"/>
+              <a:t>https://github.com/PowerShell/Plaster</a:t>
+            </a:r>
+          </a:p>
+        </p:txBody>
+      </p:sp>
+    </p:spTree>
+    <p:extLst>
+      <p:ext uri="{BB962C8B-B14F-4D97-AF65-F5344CB8AC3E}">
+        <p14:creationId xmlns:p14="http://schemas.microsoft.com/office/powerpoint/2010/main" val="3394803451"/>
+      </p:ext>
+    </p:extLst>
+  </p:cSld>
+  <p:clrMapOvr>
+    <a:masterClrMapping/>
+  </p:clrMapOvr>
+</p:sld>
+</file>
+
+<file path=ppt/slides/slide19.xml><?xml version="1.0" encoding="utf-8"?>
+<p:sld xmlns:a="http://schemas.openxmlformats.org/drawingml/2006/main" xmlns:r="http://schemas.openxmlformats.org/officeDocument/2006/relationships" xmlns:p="http://schemas.openxmlformats.org/presentationml/2006/main">
+  <p:cSld>
+    <p:spTree>
+      <p:nvGrpSpPr>
+        <p:cNvPr id="1" name=""/>
+        <p:cNvGrpSpPr/>
+        <p:nvPr/>
+      </p:nvGrpSpPr>
+      <p:grpSpPr>
+        <a:xfrm>
+          <a:off x="0" y="0"/>
+          <a:ext cx="0" cy="0"/>
+          <a:chOff x="0" y="0"/>
+          <a:chExt cx="0" cy="0"/>
+        </a:xfrm>
+      </p:grpSpPr>
+      <p:sp>
+        <p:nvSpPr>
+          <p:cNvPr id="2" name="Title 1">
+            <a:extLst>
+              <a:ext uri="{FF2B5EF4-FFF2-40B4-BE49-F238E27FC236}">
+                <a16:creationId xmlns:a16="http://schemas.microsoft.com/office/drawing/2014/main" id="{A936A3E3-F988-4946-99FD-DAD4B57CA6DD}"/>
+              </a:ext>
+            </a:extLst>
+          </p:cNvPr>
+          <p:cNvSpPr>
+            <a:spLocks noGrp="1"/>
+          </p:cNvSpPr>
+          <p:nvPr>
+            <p:ph type="title"/>
+          </p:nvPr>
+        </p:nvSpPr>
+        <p:spPr/>
+        <p:txBody>
+          <a:bodyPr/>
+          <a:lstStyle/>
+          <a:p>
+            <a:r>
+              <a:rPr lang="en-US" dirty="0"/>
+              <a:t>Pester</a:t>
+            </a:r>
+          </a:p>
+        </p:txBody>
+      </p:sp>
+      <p:sp>
+        <p:nvSpPr>
+          <p:cNvPr id="3" name="Content Placeholder 2">
+            <a:extLst>
+              <a:ext uri="{FF2B5EF4-FFF2-40B4-BE49-F238E27FC236}">
+                <a16:creationId xmlns:a16="http://schemas.microsoft.com/office/drawing/2014/main" id="{BE88C274-84E0-47C1-AD36-75231BBC2F75}"/>
+              </a:ext>
+            </a:extLst>
+          </p:cNvPr>
+          <p:cNvSpPr>
+            <a:spLocks noGrp="1"/>
+          </p:cNvSpPr>
+          <p:nvPr>
+            <p:ph idx="1"/>
+          </p:nvPr>
+        </p:nvSpPr>
+        <p:spPr/>
+        <p:txBody>
+          <a:bodyPr/>
+          <a:lstStyle/>
+          <a:p>
+            <a:r>
+              <a:rPr lang="en-US" dirty="0"/>
+              <a:t>Unit testing…we’ve done this</a:t>
+            </a:r>
+          </a:p>
+          <a:p>
+            <a:r>
+              <a:rPr lang="en-US" dirty="0"/>
+              <a:t>https://github.com/pester/Pester</a:t>
+            </a:r>
+          </a:p>
+        </p:txBody>
+      </p:sp>
+    </p:spTree>
+    <p:extLst>
+      <p:ext uri="{BB962C8B-B14F-4D97-AF65-F5344CB8AC3E}">
+        <p14:creationId xmlns:p14="http://schemas.microsoft.com/office/powerpoint/2010/main" val="1780767860"/>
       </p:ext>
     </p:extLst>
   </p:cSld>
@@ -6973,6 +7427,282 @@
     <p:extLst>
       <p:ext uri="{BB962C8B-B14F-4D97-AF65-F5344CB8AC3E}">
         <p14:creationId xmlns:p14="http://schemas.microsoft.com/office/powerpoint/2010/main" val="3645514162"/>
+      </p:ext>
+    </p:extLst>
+  </p:cSld>
+  <p:clrMapOvr>
+    <a:masterClrMapping/>
+  </p:clrMapOvr>
+</p:sld>
+</file>
+
+<file path=ppt/slides/slide20.xml><?xml version="1.0" encoding="utf-8"?>
+<p:sld xmlns:a="http://schemas.openxmlformats.org/drawingml/2006/main" xmlns:r="http://schemas.openxmlformats.org/officeDocument/2006/relationships" xmlns:p="http://schemas.openxmlformats.org/presentationml/2006/main">
+  <p:cSld>
+    <p:spTree>
+      <p:nvGrpSpPr>
+        <p:cNvPr id="1" name=""/>
+        <p:cNvGrpSpPr/>
+        <p:nvPr/>
+      </p:nvGrpSpPr>
+      <p:grpSpPr>
+        <a:xfrm>
+          <a:off x="0" y="0"/>
+          <a:ext cx="0" cy="0"/>
+          <a:chOff x="0" y="0"/>
+          <a:chExt cx="0" cy="0"/>
+        </a:xfrm>
+      </p:grpSpPr>
+      <p:sp>
+        <p:nvSpPr>
+          <p:cNvPr id="2" name="Title 1">
+            <a:extLst>
+              <a:ext uri="{FF2B5EF4-FFF2-40B4-BE49-F238E27FC236}">
+                <a16:creationId xmlns:a16="http://schemas.microsoft.com/office/drawing/2014/main" id="{3DA6D899-9A8C-4664-A535-B0FC6E441483}"/>
+              </a:ext>
+            </a:extLst>
+          </p:cNvPr>
+          <p:cNvSpPr>
+            <a:spLocks noGrp="1"/>
+          </p:cNvSpPr>
+          <p:nvPr>
+            <p:ph type="title"/>
+          </p:nvPr>
+        </p:nvSpPr>
+        <p:spPr/>
+        <p:txBody>
+          <a:bodyPr/>
+          <a:lstStyle/>
+          <a:p>
+            <a:r>
+              <a:rPr lang="en-US" dirty="0" err="1"/>
+              <a:t>BuildHelpers</a:t>
+            </a:r>
+            <a:endParaRPr lang="en-US" dirty="0"/>
+          </a:p>
+        </p:txBody>
+      </p:sp>
+      <p:sp>
+        <p:nvSpPr>
+          <p:cNvPr id="3" name="Content Placeholder 2">
+            <a:extLst>
+              <a:ext uri="{FF2B5EF4-FFF2-40B4-BE49-F238E27FC236}">
+                <a16:creationId xmlns:a16="http://schemas.microsoft.com/office/drawing/2014/main" id="{C733D724-EB9A-4F90-9B9F-2F723E1FB550}"/>
+              </a:ext>
+            </a:extLst>
+          </p:cNvPr>
+          <p:cNvSpPr>
+            <a:spLocks noGrp="1"/>
+          </p:cNvSpPr>
+          <p:nvPr>
+            <p:ph idx="1"/>
+          </p:nvPr>
+        </p:nvSpPr>
+        <p:spPr>
+          <a:xfrm>
+            <a:off x="677334" y="1484851"/>
+            <a:ext cx="8596668" cy="4556511"/>
+          </a:xfrm>
+        </p:spPr>
+        <p:txBody>
+          <a:bodyPr/>
+          <a:lstStyle/>
+          <a:p>
+            <a:r>
+              <a:rPr lang="en-US" dirty="0"/>
+              <a:t>Miscellaneous functions that assist with builds</a:t>
+            </a:r>
+          </a:p>
+          <a:p>
+            <a:r>
+              <a:rPr lang="en-US" dirty="0"/>
+              <a:t>I’m using Set-</a:t>
+            </a:r>
+            <a:r>
+              <a:rPr lang="en-US" dirty="0" err="1"/>
+              <a:t>BuildEnvironment</a:t>
+            </a:r>
+            <a:endParaRPr lang="en-US" dirty="0"/>
+          </a:p>
+          <a:p>
+            <a:pPr lvl="1"/>
+            <a:r>
+              <a:rPr lang="en-US" dirty="0"/>
+              <a:t>Creates “normalized” environment variables</a:t>
+            </a:r>
+          </a:p>
+          <a:p>
+            <a:r>
+              <a:rPr lang="en-US" dirty="0"/>
+              <a:t>I’m also using Set-</a:t>
+            </a:r>
+            <a:r>
+              <a:rPr lang="en-US" dirty="0" err="1"/>
+              <a:t>ModuleFunctions</a:t>
+            </a:r>
+            <a:endParaRPr lang="en-US" dirty="0"/>
+          </a:p>
+          <a:p>
+            <a:pPr lvl="1"/>
+            <a:r>
+              <a:rPr lang="en-US" dirty="0"/>
+              <a:t>Sets the “</a:t>
+            </a:r>
+            <a:r>
+              <a:rPr lang="en-US" dirty="0" err="1"/>
+              <a:t>FunctionsToExport</a:t>
+            </a:r>
+            <a:r>
+              <a:rPr lang="en-US" dirty="0"/>
+              <a:t>” in the module manifest to all of the items exported by the .psm1 file</a:t>
+            </a:r>
+          </a:p>
+          <a:p>
+            <a:r>
+              <a:rPr lang="en-US" dirty="0"/>
+              <a:t>Get-</a:t>
+            </a:r>
+            <a:r>
+              <a:rPr lang="en-US" dirty="0" err="1"/>
+              <a:t>NextPSGalleryVersion</a:t>
+            </a:r>
+            <a:endParaRPr lang="en-US" dirty="0"/>
+          </a:p>
+          <a:p>
+            <a:r>
+              <a:rPr lang="en-US" dirty="0"/>
+              <a:t>Update-Metadata (to update the module version)</a:t>
+            </a:r>
+          </a:p>
+          <a:p>
+            <a:endParaRPr lang="en-US" dirty="0"/>
+          </a:p>
+          <a:p>
+            <a:endParaRPr lang="en-US" dirty="0"/>
+          </a:p>
+          <a:p>
+            <a:r>
+              <a:rPr lang="en-US" dirty="0"/>
+              <a:t>https://github.com/RamblingCookieMonster/BuildHelpers</a:t>
+            </a:r>
+          </a:p>
+        </p:txBody>
+      </p:sp>
+    </p:spTree>
+    <p:extLst>
+      <p:ext uri="{BB962C8B-B14F-4D97-AF65-F5344CB8AC3E}">
+        <p14:creationId xmlns:p14="http://schemas.microsoft.com/office/powerpoint/2010/main" val="4248064827"/>
+      </p:ext>
+    </p:extLst>
+  </p:cSld>
+  <p:clrMapOvr>
+    <a:masterClrMapping/>
+  </p:clrMapOvr>
+</p:sld>
+</file>
+
+<file path=ppt/slides/slide21.xml><?xml version="1.0" encoding="utf-8"?>
+<p:sld xmlns:a="http://schemas.openxmlformats.org/drawingml/2006/main" xmlns:r="http://schemas.openxmlformats.org/officeDocument/2006/relationships" xmlns:p="http://schemas.openxmlformats.org/presentationml/2006/main">
+  <p:cSld>
+    <p:spTree>
+      <p:nvGrpSpPr>
+        <p:cNvPr id="1" name=""/>
+        <p:cNvGrpSpPr/>
+        <p:nvPr/>
+      </p:nvGrpSpPr>
+      <p:grpSpPr>
+        <a:xfrm>
+          <a:off x="0" y="0"/>
+          <a:ext cx="0" cy="0"/>
+          <a:chOff x="0" y="0"/>
+          <a:chExt cx="0" cy="0"/>
+        </a:xfrm>
+      </p:grpSpPr>
+      <p:sp>
+        <p:nvSpPr>
+          <p:cNvPr id="2" name="Title 1">
+            <a:extLst>
+              <a:ext uri="{FF2B5EF4-FFF2-40B4-BE49-F238E27FC236}">
+                <a16:creationId xmlns:a16="http://schemas.microsoft.com/office/drawing/2014/main" id="{A26B53D7-9D4A-4E3E-B143-108FB2A431E4}"/>
+              </a:ext>
+            </a:extLst>
+          </p:cNvPr>
+          <p:cNvSpPr>
+            <a:spLocks noGrp="1"/>
+          </p:cNvSpPr>
+          <p:nvPr>
+            <p:ph type="title"/>
+          </p:nvPr>
+        </p:nvSpPr>
+        <p:spPr>
+          <a:xfrm>
+            <a:off x="677334" y="609600"/>
+            <a:ext cx="8596668" cy="866862"/>
+          </a:xfrm>
+        </p:spPr>
+        <p:txBody>
+          <a:bodyPr/>
+          <a:lstStyle/>
+          <a:p>
+            <a:r>
+              <a:rPr lang="en-US" dirty="0" err="1"/>
+              <a:t>PSDeploy</a:t>
+            </a:r>
+            <a:endParaRPr lang="en-US" dirty="0"/>
+          </a:p>
+        </p:txBody>
+      </p:sp>
+      <p:sp>
+        <p:nvSpPr>
+          <p:cNvPr id="3" name="Content Placeholder 2">
+            <a:extLst>
+              <a:ext uri="{FF2B5EF4-FFF2-40B4-BE49-F238E27FC236}">
+                <a16:creationId xmlns:a16="http://schemas.microsoft.com/office/drawing/2014/main" id="{39D93182-752A-4446-9BDB-2EAD1F7302F2}"/>
+              </a:ext>
+            </a:extLst>
+          </p:cNvPr>
+          <p:cNvSpPr>
+            <a:spLocks noGrp="1"/>
+          </p:cNvSpPr>
+          <p:nvPr>
+            <p:ph idx="1"/>
+          </p:nvPr>
+        </p:nvSpPr>
+        <p:spPr/>
+        <p:txBody>
+          <a:bodyPr/>
+          <a:lstStyle/>
+          <a:p>
+            <a:r>
+              <a:rPr lang="en-US" dirty="0"/>
+              <a:t>Don’t know a lot about this</a:t>
+            </a:r>
+          </a:p>
+          <a:p>
+            <a:r>
+              <a:rPr lang="en-US" dirty="0"/>
+              <a:t>I’m using it to publish my module to PowerShell Gallery</a:t>
+            </a:r>
+          </a:p>
+          <a:p>
+            <a:r>
+              <a:rPr lang="en-US" dirty="0"/>
+              <a:t>Looks like an interesting deployment tool  </a:t>
+            </a:r>
+            <a:r>
+              <a:rPr lang="en-US" dirty="0">
+                <a:sym typeface="Wingdings" panose="05000000000000000000" pitchFamily="2" charset="2"/>
+              </a:rPr>
+              <a:t></a:t>
+            </a:r>
+            <a:endParaRPr lang="en-US" dirty="0"/>
+          </a:p>
+        </p:txBody>
+      </p:sp>
+    </p:spTree>
+    <p:extLst>
+      <p:ext uri="{BB962C8B-B14F-4D97-AF65-F5344CB8AC3E}">
+        <p14:creationId xmlns:p14="http://schemas.microsoft.com/office/powerpoint/2010/main" val="2278180812"/>
       </p:ext>
     </p:extLst>
   </p:cSld>
@@ -7443,7 +8173,7 @@
           <p:cNvPr id="2" name="Title 1">
             <a:extLst>
               <a:ext uri="{FF2B5EF4-FFF2-40B4-BE49-F238E27FC236}">
-                <a16:creationId xmlns:a16="http://schemas.microsoft.com/office/drawing/2014/main" id="{76578C97-845A-40CC-9B1E-AE6E9D79E801}"/>
+                <a16:creationId xmlns:a16="http://schemas.microsoft.com/office/drawing/2014/main" id="{9A36E3EF-97AB-4AEF-A179-E54AB542490D}"/>
               </a:ext>
             </a:extLst>
           </p:cNvPr>
@@ -7454,20 +8184,16 @@
             <p:ph type="title"/>
           </p:nvPr>
         </p:nvSpPr>
-        <p:spPr>
-          <a:xfrm>
-            <a:off x="677334" y="609600"/>
-            <a:ext cx="8596668" cy="858253"/>
-          </a:xfrm>
-        </p:spPr>
-        <p:txBody>
-          <a:bodyPr/>
-          <a:lstStyle/>
-          <a:p>
-            <a:r>
-              <a:rPr lang="en-US" dirty="0"/>
-              <a:t>Basic Module Operations</a:t>
-            </a:r>
+        <p:spPr/>
+        <p:txBody>
+          <a:bodyPr/>
+          <a:lstStyle/>
+          <a:p>
+            <a:r>
+              <a:rPr lang="en-US" dirty="0" err="1"/>
+              <a:t>PSModulePath</a:t>
+            </a:r>
+            <a:endParaRPr lang="en-US" dirty="0"/>
           </a:p>
         </p:txBody>
       </p:sp>
@@ -7476,7 +8202,7 @@
           <p:cNvPr id="3" name="Content Placeholder 2">
             <a:extLst>
               <a:ext uri="{FF2B5EF4-FFF2-40B4-BE49-F238E27FC236}">
-                <a16:creationId xmlns:a16="http://schemas.microsoft.com/office/drawing/2014/main" id="{9AB7C364-EE48-4C90-9778-CBE6A29B71F5}"/>
+                <a16:creationId xmlns:a16="http://schemas.microsoft.com/office/drawing/2014/main" id="{7EB044BC-7BD8-469E-8162-A00BD10795BB}"/>
               </a:ext>
             </a:extLst>
           </p:cNvPr>
@@ -7487,37 +8213,19 @@
             <p:ph idx="1"/>
           </p:nvPr>
         </p:nvSpPr>
-        <p:spPr>
-          <a:xfrm>
-            <a:off x="677334" y="2292937"/>
-            <a:ext cx="8596668" cy="3880773"/>
-          </a:xfrm>
-        </p:spPr>
-        <p:txBody>
-          <a:bodyPr/>
-          <a:lstStyle/>
-          <a:p>
-            <a:r>
-              <a:rPr lang="en-US" dirty="0"/>
-              <a:t>What Modules are on the system?</a:t>
-            </a:r>
-          </a:p>
-          <a:p>
-            <a:r>
-              <a:rPr lang="en-US" dirty="0"/>
-              <a:t>What functions are in a module?</a:t>
-            </a:r>
-          </a:p>
-          <a:p>
-            <a:r>
-              <a:rPr lang="en-US" dirty="0"/>
-              <a:t>Module Autoloading</a:t>
-            </a:r>
-          </a:p>
-          <a:p>
-            <a:endParaRPr lang="en-US" dirty="0"/>
-          </a:p>
-          <a:p>
+        <p:spPr/>
+        <p:txBody>
+          <a:bodyPr/>
+          <a:lstStyle/>
+          <a:p>
+            <a:r>
+              <a:rPr lang="en-US" dirty="0"/>
+              <a:t>Move it to a correctly named folder in the </a:t>
+            </a:r>
+            <a:r>
+              <a:rPr lang="en-US" dirty="0" err="1"/>
+              <a:t>PSModulePath</a:t>
+            </a:r>
             <a:endParaRPr lang="en-US" dirty="0"/>
           </a:p>
         </p:txBody>
@@ -7525,7 +8233,7 @@
     </p:spTree>
     <p:extLst>
       <p:ext uri="{BB962C8B-B14F-4D97-AF65-F5344CB8AC3E}">
-        <p14:creationId xmlns:p14="http://schemas.microsoft.com/office/powerpoint/2010/main" val="3554669625"/>
+        <p14:creationId xmlns:p14="http://schemas.microsoft.com/office/powerpoint/2010/main" val="329980776"/>
       </p:ext>
     </p:extLst>
   </p:cSld>
@@ -7557,7 +8265,7 @@
           <p:cNvPr id="2" name="Title 1">
             <a:extLst>
               <a:ext uri="{FF2B5EF4-FFF2-40B4-BE49-F238E27FC236}">
-                <a16:creationId xmlns:a16="http://schemas.microsoft.com/office/drawing/2014/main" id="{9A36E3EF-97AB-4AEF-A179-E54AB542490D}"/>
+                <a16:creationId xmlns:a16="http://schemas.microsoft.com/office/drawing/2014/main" id="{CFBBA115-FC42-4C33-B773-2A95952115CB}"/>
               </a:ext>
             </a:extLst>
           </p:cNvPr>
@@ -7574,10 +8282,9 @@
           <a:lstStyle/>
           <a:p>
             <a:r>
-              <a:rPr lang="en-US" dirty="0" err="1"/>
-              <a:t>PSModulePath</a:t>
-            </a:r>
-            <a:endParaRPr lang="en-US" dirty="0"/>
+              <a:rPr lang="en-US" dirty="0"/>
+              <a:t>Add a Manifest file</a:t>
+            </a:r>
           </a:p>
         </p:txBody>
       </p:sp>
@@ -7586,7 +8293,7 @@
           <p:cNvPr id="3" name="Content Placeholder 2">
             <a:extLst>
               <a:ext uri="{FF2B5EF4-FFF2-40B4-BE49-F238E27FC236}">
-                <a16:creationId xmlns:a16="http://schemas.microsoft.com/office/drawing/2014/main" id="{7EB044BC-7BD8-469E-8162-A00BD10795BB}"/>
+                <a16:creationId xmlns:a16="http://schemas.microsoft.com/office/drawing/2014/main" id="{6C6677EE-384B-44D9-B914-B9AD75B5BA86}"/>
               </a:ext>
             </a:extLst>
           </p:cNvPr>
@@ -7604,22 +8311,17 @@
           <a:p>
             <a:r>
               <a:rPr lang="en-US" dirty="0"/>
-              <a:t>Move it to a correctly named folder in the </a:t>
+              <a:t>.psd1 file</a:t>
+            </a:r>
+          </a:p>
+          <a:p>
+            <a:r>
+              <a:rPr lang="en-US" dirty="0"/>
+              <a:t>New-</a:t>
             </a:r>
             <a:r>
               <a:rPr lang="en-US" dirty="0" err="1"/>
-              <a:t>PSModulePath</a:t>
-            </a:r>
-            <a:endParaRPr lang="en-US" dirty="0"/>
-          </a:p>
-          <a:p>
-            <a:r>
-              <a:rPr lang="en-US" dirty="0"/>
-              <a:t>Now, you don’t need to know the path, just the </a:t>
-            </a:r>
-            <a:r>
-              <a:rPr lang="en-US"/>
-              <a:t>module name</a:t>
+              <a:t>ModuleManifest</a:t>
             </a:r>
             <a:endParaRPr lang="en-US" dirty="0"/>
           </a:p>
@@ -7628,7 +8330,7 @@
     </p:spTree>
     <p:extLst>
       <p:ext uri="{BB962C8B-B14F-4D97-AF65-F5344CB8AC3E}">
-        <p14:creationId xmlns:p14="http://schemas.microsoft.com/office/powerpoint/2010/main" val="329980776"/>
+        <p14:creationId xmlns:p14="http://schemas.microsoft.com/office/powerpoint/2010/main" val="733701125"/>
       </p:ext>
     </p:extLst>
   </p:cSld>
@@ -7660,7 +8362,7 @@
           <p:cNvPr id="2" name="Title 1">
             <a:extLst>
               <a:ext uri="{FF2B5EF4-FFF2-40B4-BE49-F238E27FC236}">
-                <a16:creationId xmlns:a16="http://schemas.microsoft.com/office/drawing/2014/main" id="{CFBBA115-FC42-4C33-B773-2A95952115CB}"/>
+                <a16:creationId xmlns:a16="http://schemas.microsoft.com/office/drawing/2014/main" id="{4473EBEA-96E8-460F-AE05-6944A0CA8225}"/>
               </a:ext>
             </a:extLst>
           </p:cNvPr>
@@ -7678,7 +8380,7 @@
           <a:p>
             <a:r>
               <a:rPr lang="en-US" dirty="0"/>
-              <a:t>Add a Manifest file</a:t>
+              <a:t>Binary Modules</a:t>
             </a:r>
           </a:p>
         </p:txBody>
@@ -7688,7 +8390,7 @@
           <p:cNvPr id="3" name="Content Placeholder 2">
             <a:extLst>
               <a:ext uri="{FF2B5EF4-FFF2-40B4-BE49-F238E27FC236}">
-                <a16:creationId xmlns:a16="http://schemas.microsoft.com/office/drawing/2014/main" id="{6C6677EE-384B-44D9-B914-B9AD75B5BA86}"/>
+                <a16:creationId xmlns:a16="http://schemas.microsoft.com/office/drawing/2014/main" id="{AF3198F1-A301-4E5B-A357-FECBCC59EDDC}"/>
               </a:ext>
             </a:extLst>
           </p:cNvPr>
@@ -7705,19 +8407,55 @@
           <a:lstStyle/>
           <a:p>
             <a:r>
-              <a:rPr lang="en-US" dirty="0"/>
-              <a:t>.psd1 file</a:t>
-            </a:r>
-          </a:p>
-          <a:p>
-            <a:r>
-              <a:rPr lang="en-US" dirty="0"/>
-              <a:t>New-</a:t>
-            </a:r>
-            <a:r>
               <a:rPr lang="en-US" dirty="0" err="1"/>
-              <a:t>ModuleManifest</a:t>
-            </a:r>
+              <a:t>Dlls</a:t>
+            </a:r>
+            <a:r>
+              <a:rPr lang="en-US" dirty="0"/>
+              <a:t> that contain public classes inheriting from Cmdlet or </a:t>
+            </a:r>
+            <a:r>
+              <a:rPr lang="en-US" dirty="0" err="1"/>
+              <a:t>PSCmdlet</a:t>
+            </a:r>
+            <a:r>
+              <a:rPr lang="en-US" dirty="0"/>
+              <a:t> can be imported (either directly or as nested modules)</a:t>
+            </a:r>
+          </a:p>
+          <a:p>
+            <a:r>
+              <a:rPr lang="en-US" dirty="0"/>
+              <a:t>Public classes and variables are exported from the </a:t>
+            </a:r>
+            <a:r>
+              <a:rPr lang="en-US" dirty="0" err="1"/>
+              <a:t>dll</a:t>
+            </a:r>
+            <a:r>
+              <a:rPr lang="en-US" dirty="0"/>
+              <a:t> (unless overridden in manifest or import-module statement)</a:t>
+            </a:r>
+          </a:p>
+          <a:p>
+            <a:r>
+              <a:rPr lang="en-US" dirty="0"/>
+              <a:t>Allows you to use C# stuff in PowerShell</a:t>
+            </a:r>
+          </a:p>
+          <a:p>
+            <a:pPr lvl="1"/>
+            <a:r>
+              <a:rPr lang="en-US" dirty="0"/>
+              <a:t>Not as easy as writing straight PowerShell, but not hard, either</a:t>
+            </a:r>
+          </a:p>
+          <a:p>
+            <a:pPr lvl="1"/>
+            <a:endParaRPr lang="en-US" dirty="0"/>
+          </a:p>
+          <a:p>
+            <a:pPr lvl="1"/>
             <a:endParaRPr lang="en-US" dirty="0"/>
           </a:p>
         </p:txBody>
@@ -7725,7 +8463,7 @@
     </p:spTree>
     <p:extLst>
       <p:ext uri="{BB962C8B-B14F-4D97-AF65-F5344CB8AC3E}">
-        <p14:creationId xmlns:p14="http://schemas.microsoft.com/office/powerpoint/2010/main" val="733701125"/>
+        <p14:creationId xmlns:p14="http://schemas.microsoft.com/office/powerpoint/2010/main" val="687422125"/>
       </p:ext>
     </p:extLst>
   </p:cSld>
@@ -7775,7 +8513,7 @@
           <a:p>
             <a:r>
               <a:rPr lang="en-US" dirty="0"/>
-              <a:t>Binary Modules</a:t>
+              <a:t>Binary Module Example</a:t>
             </a:r>
           </a:p>
         </p:txBody>
@@ -7796,69 +8534,220 @@
             <p:ph idx="1"/>
           </p:nvPr>
         </p:nvSpPr>
-        <p:spPr/>
-        <p:txBody>
-          <a:bodyPr/>
-          <a:lstStyle/>
-          <a:p>
+        <p:spPr>
+          <a:xfrm>
+            <a:off x="677334" y="1308683"/>
+            <a:ext cx="8596668" cy="4732679"/>
+          </a:xfrm>
+        </p:spPr>
+        <p:txBody>
+          <a:bodyPr>
+            <a:normAutofit fontScale="77500" lnSpcReduction="20000"/>
+          </a:bodyPr>
+          <a:lstStyle/>
+          <a:p>
+            <a:pPr marL="457200" lvl="1" indent="0">
+              <a:buNone/>
+            </a:pPr>
+            <a:endParaRPr lang="en-US" dirty="0"/>
+          </a:p>
+          <a:p>
+            <a:pPr marL="457200" lvl="1" indent="0">
+              <a:buNone/>
+            </a:pPr>
+            <a:r>
+              <a:rPr lang="en-US" dirty="0"/>
+              <a:t>add-type -</a:t>
+            </a:r>
             <a:r>
               <a:rPr lang="en-US" dirty="0" err="1"/>
-              <a:t>Dlls</a:t>
-            </a:r>
-            <a:r>
-              <a:rPr lang="en-US" dirty="0"/>
-              <a:t> that contain public classes inheriting from Cmdlet or </a:t>
+              <a:t>TypeDefinition</a:t>
+            </a:r>
+            <a:r>
+              <a:rPr lang="en-US" dirty="0"/>
+              <a:t> @'</a:t>
+            </a:r>
+          </a:p>
+          <a:p>
+            <a:pPr marL="457200" lvl="1" indent="0">
+              <a:buNone/>
+            </a:pPr>
+            <a:r>
+              <a:rPr lang="en-US" dirty="0"/>
+              <a:t>using </a:t>
             </a:r>
             <a:r>
               <a:rPr lang="en-US" dirty="0" err="1"/>
-              <a:t>PSCmdlet</a:t>
-            </a:r>
-            <a:r>
-              <a:rPr lang="en-US" dirty="0"/>
-              <a:t> can be imported (either directly or as nested modules)</a:t>
-            </a:r>
-          </a:p>
-          <a:p>
-            <a:r>
-              <a:rPr lang="en-US" dirty="0"/>
-              <a:t>Public classes and variables are exported from the </a:t>
+              <a:t>System.Management.Automation</a:t>
+            </a:r>
+            <a:r>
+              <a:rPr lang="en-US" dirty="0"/>
+              <a:t>;</a:t>
+            </a:r>
+          </a:p>
+          <a:p>
+            <a:pPr marL="457200" lvl="1" indent="0">
+              <a:buNone/>
+            </a:pPr>
+            <a:endParaRPr lang="en-US" dirty="0"/>
+          </a:p>
+          <a:p>
+            <a:pPr marL="457200" lvl="1" indent="0">
+              <a:buNone/>
+            </a:pPr>
+            <a:r>
+              <a:rPr lang="en-US" dirty="0"/>
+              <a:t>[Cmdlet("Add","</a:t>
             </a:r>
             <a:r>
               <a:rPr lang="en-US" dirty="0" err="1"/>
-              <a:t>dll</a:t>
-            </a:r>
-            <a:r>
-              <a:rPr lang="en-US" dirty="0"/>
-              <a:t> (unless overridden in manifest or import-module statement)</a:t>
-            </a:r>
-          </a:p>
-          <a:p>
-            <a:r>
-              <a:rPr lang="en-US" dirty="0"/>
-              <a:t>Allows you to use C# stuff in PowerShell</a:t>
-            </a:r>
-          </a:p>
-          <a:p>
-            <a:pPr lvl="1"/>
-            <a:r>
-              <a:rPr lang="en-US" dirty="0"/>
-              <a:t>Not as easy as writing straight PowerShell, but not hard, either</a:t>
-            </a:r>
-          </a:p>
-          <a:p>
-            <a:pPr lvl="1"/>
-            <a:endParaRPr lang="en-US" dirty="0"/>
-          </a:p>
-          <a:p>
-            <a:pPr lvl="1"/>
-            <a:endParaRPr lang="en-US" dirty="0"/>
+              <a:t>CSharpStuff</a:t>
+            </a:r>
+            <a:r>
+              <a:rPr lang="en-US" dirty="0"/>
+              <a:t>")]</a:t>
+            </a:r>
+          </a:p>
+          <a:p>
+            <a:pPr marL="457200" lvl="1" indent="0">
+              <a:buNone/>
+            </a:pPr>
+            <a:r>
+              <a:rPr lang="en-US" dirty="0"/>
+              <a:t>public class </a:t>
+            </a:r>
+            <a:r>
+              <a:rPr lang="en-US" dirty="0" err="1"/>
+              <a:t>MyAddCharpStuffCmdlet</a:t>
+            </a:r>
+            <a:r>
+              <a:rPr lang="en-US" dirty="0"/>
+              <a:t> : Cmdlet{</a:t>
+            </a:r>
+          </a:p>
+          <a:p>
+            <a:pPr marL="457200" lvl="1" indent="0">
+              <a:buNone/>
+            </a:pPr>
+            <a:r>
+              <a:rPr lang="en-US" dirty="0"/>
+              <a:t>    [Parameter]</a:t>
+            </a:r>
+          </a:p>
+          <a:p>
+            <a:pPr marL="457200" lvl="1" indent="0">
+              <a:buNone/>
+            </a:pPr>
+            <a:r>
+              <a:rPr lang="en-US" dirty="0"/>
+              <a:t>    public string A;</a:t>
+            </a:r>
+          </a:p>
+          <a:p>
+            <a:pPr marL="457200" lvl="1" indent="0">
+              <a:buNone/>
+            </a:pPr>
+            <a:endParaRPr lang="en-US" dirty="0"/>
+          </a:p>
+          <a:p>
+            <a:pPr marL="457200" lvl="1" indent="0">
+              <a:buNone/>
+            </a:pPr>
+            <a:r>
+              <a:rPr lang="en-US" dirty="0"/>
+              <a:t>    [Parameter]</a:t>
+            </a:r>
+          </a:p>
+          <a:p>
+            <a:pPr marL="457200" lvl="1" indent="0">
+              <a:buNone/>
+            </a:pPr>
+            <a:r>
+              <a:rPr lang="en-US" dirty="0"/>
+              <a:t>    public string B;</a:t>
+            </a:r>
+          </a:p>
+          <a:p>
+            <a:pPr marL="457200" lvl="1" indent="0">
+              <a:buNone/>
+            </a:pPr>
+            <a:endParaRPr lang="en-US" dirty="0"/>
+          </a:p>
+          <a:p>
+            <a:pPr marL="457200" lvl="1" indent="0">
+              <a:buNone/>
+            </a:pPr>
+            <a:r>
+              <a:rPr lang="en-US" dirty="0"/>
+              <a:t>    protected override void </a:t>
+            </a:r>
+            <a:r>
+              <a:rPr lang="en-US" dirty="0" err="1"/>
+              <a:t>EndProcessing</a:t>
+            </a:r>
+            <a:r>
+              <a:rPr lang="en-US" dirty="0"/>
+              <a:t>(){</a:t>
+            </a:r>
+          </a:p>
+          <a:p>
+            <a:pPr marL="457200" lvl="1" indent="0">
+              <a:buNone/>
+            </a:pPr>
+            <a:r>
+              <a:rPr lang="en-US" dirty="0"/>
+              <a:t>        </a:t>
+            </a:r>
+            <a:r>
+              <a:rPr lang="en-US" dirty="0" err="1"/>
+              <a:t>WriteObject</a:t>
+            </a:r>
+            <a:r>
+              <a:rPr lang="en-US" dirty="0"/>
+              <a:t>(A+B);</a:t>
+            </a:r>
+          </a:p>
+          <a:p>
+            <a:pPr marL="457200" lvl="1" indent="0">
+              <a:buNone/>
+            </a:pPr>
+            <a:r>
+              <a:rPr lang="en-US" dirty="0"/>
+              <a:t>    }</a:t>
+            </a:r>
+          </a:p>
+          <a:p>
+            <a:pPr marL="457200" lvl="1" indent="0">
+              <a:buNone/>
+            </a:pPr>
+            <a:r>
+              <a:rPr lang="en-US" dirty="0"/>
+              <a:t>}</a:t>
+            </a:r>
+          </a:p>
+          <a:p>
+            <a:pPr marL="457200" lvl="1" indent="0">
+              <a:buNone/>
+            </a:pPr>
+            <a:r>
+              <a:rPr lang="en-US" dirty="0"/>
+              <a:t>'@ -</a:t>
+            </a:r>
+            <a:r>
+              <a:rPr lang="en-US" dirty="0" err="1"/>
+              <a:t>outputAssembly</a:t>
+            </a:r>
+            <a:r>
+              <a:rPr lang="en-US" dirty="0"/>
+              <a:t> c:\temp\AddCSharpStuff.dll</a:t>
+            </a:r>
           </a:p>
         </p:txBody>
       </p:sp>
     </p:spTree>
     <p:extLst>
       <p:ext uri="{BB962C8B-B14F-4D97-AF65-F5344CB8AC3E}">
-        <p14:creationId xmlns:p14="http://schemas.microsoft.com/office/powerpoint/2010/main" val="687422125"/>
+        <p14:creationId xmlns:p14="http://schemas.microsoft.com/office/powerpoint/2010/main" val="3754694344"/>
       </p:ext>
     </p:extLst>
   </p:cSld>
@@ -7890,7 +8779,7 @@
           <p:cNvPr id="2" name="Title 1">
             <a:extLst>
               <a:ext uri="{FF2B5EF4-FFF2-40B4-BE49-F238E27FC236}">
-                <a16:creationId xmlns:a16="http://schemas.microsoft.com/office/drawing/2014/main" id="{4473EBEA-96E8-460F-AE05-6944A0CA8225}"/>
+                <a16:creationId xmlns:a16="http://schemas.microsoft.com/office/drawing/2014/main" id="{25525F8C-492F-437A-83B7-E584D4A0ED85}"/>
               </a:ext>
             </a:extLst>
           </p:cNvPr>
@@ -7901,14 +8790,19 @@
             <p:ph type="title"/>
           </p:nvPr>
         </p:nvSpPr>
-        <p:spPr/>
-        <p:txBody>
-          <a:bodyPr/>
-          <a:lstStyle/>
-          <a:p>
-            <a:r>
-              <a:rPr lang="en-US" dirty="0"/>
-              <a:t>Binary Module Example</a:t>
+        <p:spPr>
+          <a:xfrm>
+            <a:off x="677334" y="609600"/>
+            <a:ext cx="8596668" cy="741028"/>
+          </a:xfrm>
+        </p:spPr>
+        <p:txBody>
+          <a:bodyPr/>
+          <a:lstStyle/>
+          <a:p>
+            <a:r>
+              <a:rPr lang="en-US" dirty="0"/>
+              <a:t>CIM Modules</a:t>
             </a:r>
           </a:p>
         </p:txBody>
@@ -7918,7 +8812,7 @@
           <p:cNvPr id="3" name="Content Placeholder 2">
             <a:extLst>
               <a:ext uri="{FF2B5EF4-FFF2-40B4-BE49-F238E27FC236}">
-                <a16:creationId xmlns:a16="http://schemas.microsoft.com/office/drawing/2014/main" id="{AF3198F1-A301-4E5B-A357-FECBCC59EDDC}"/>
+                <a16:creationId xmlns:a16="http://schemas.microsoft.com/office/drawing/2014/main" id="{F4B4FC8F-F5F1-477B-8360-43D13C97F715}"/>
               </a:ext>
             </a:extLst>
           </p:cNvPr>
@@ -7929,212 +8823,57 @@
             <p:ph idx="1"/>
           </p:nvPr>
         </p:nvSpPr>
-        <p:spPr>
-          <a:xfrm>
-            <a:off x="677334" y="1308683"/>
-            <a:ext cx="8596668" cy="4732679"/>
-          </a:xfrm>
-        </p:spPr>
-        <p:txBody>
-          <a:bodyPr>
-            <a:normAutofit fontScale="77500" lnSpcReduction="20000"/>
-          </a:bodyPr>
-          <a:lstStyle/>
-          <a:p>
-            <a:pPr marL="457200" lvl="1" indent="0">
-              <a:buNone/>
-            </a:pPr>
-            <a:endParaRPr lang="en-US" dirty="0"/>
-          </a:p>
-          <a:p>
-            <a:pPr marL="457200" lvl="1" indent="0">
-              <a:buNone/>
-            </a:pPr>
-            <a:r>
-              <a:rPr lang="en-US" dirty="0"/>
-              <a:t>add-type -</a:t>
+        <p:spPr/>
+        <p:txBody>
+          <a:bodyPr/>
+          <a:lstStyle/>
+          <a:p>
+            <a:r>
+              <a:rPr lang="en-US" dirty="0"/>
+              <a:t>Modules based on CIM Classes (and cmdlets)</a:t>
+            </a:r>
+          </a:p>
+          <a:p>
+            <a:r>
+              <a:rPr lang="en-US" dirty="0"/>
+              <a:t>Cmdlet definitions are actually just XML mapping parameters (mostly) to CIM Class properties</a:t>
+            </a:r>
+          </a:p>
+          <a:p>
+            <a:r>
+              <a:rPr lang="en-US" dirty="0"/>
+              <a:t>Example: </a:t>
             </a:r>
             <a:r>
               <a:rPr lang="en-US" dirty="0" err="1"/>
-              <a:t>TypeDefinition</a:t>
-            </a:r>
-            <a:r>
-              <a:rPr lang="en-US" dirty="0"/>
-              <a:t> @'</a:t>
-            </a:r>
-          </a:p>
-          <a:p>
-            <a:pPr marL="457200" lvl="1" indent="0">
-              <a:buNone/>
-            </a:pPr>
-            <a:r>
-              <a:rPr lang="en-US" dirty="0"/>
-              <a:t>using </a:t>
+              <a:t>SMBShare</a:t>
+            </a:r>
+            <a:endParaRPr lang="en-US" dirty="0"/>
+          </a:p>
+          <a:p>
+            <a:r>
+              <a:rPr lang="en-US" dirty="0"/>
+              <a:t>C:\Windows\system32\WindowsPowerShell\v1.0\Modules\SmbShare</a:t>
+            </a:r>
+          </a:p>
+          <a:p>
+            <a:r>
+              <a:rPr lang="en-US" dirty="0"/>
+              <a:t>Interestingly, it’s actually a manifest module, but all it does in include nested </a:t>
             </a:r>
             <a:r>
               <a:rPr lang="en-US" dirty="0" err="1"/>
-              <a:t>System.Management.Automation</a:t>
-            </a:r>
-            <a:r>
-              <a:rPr lang="en-US" dirty="0"/>
-              <a:t>;</a:t>
-            </a:r>
-          </a:p>
-          <a:p>
-            <a:pPr marL="457200" lvl="1" indent="0">
-              <a:buNone/>
-            </a:pPr>
-            <a:endParaRPr lang="en-US" dirty="0"/>
-          </a:p>
-          <a:p>
-            <a:pPr marL="457200" lvl="1" indent="0">
-              <a:buNone/>
-            </a:pPr>
-            <a:r>
-              <a:rPr lang="en-US" dirty="0"/>
-              <a:t>[Cmdlet("Add","</a:t>
-            </a:r>
-            <a:r>
-              <a:rPr lang="en-US" dirty="0" err="1"/>
-              <a:t>CSharpStuff</a:t>
-            </a:r>
-            <a:r>
-              <a:rPr lang="en-US" dirty="0"/>
-              <a:t>")]</a:t>
-            </a:r>
-          </a:p>
-          <a:p>
-            <a:pPr marL="457200" lvl="1" indent="0">
-              <a:buNone/>
-            </a:pPr>
-            <a:r>
-              <a:rPr lang="en-US" dirty="0"/>
-              <a:t>public class </a:t>
-            </a:r>
-            <a:r>
-              <a:rPr lang="en-US" dirty="0" err="1"/>
-              <a:t>MyAddCharpStuffCmdlet</a:t>
-            </a:r>
-            <a:r>
-              <a:rPr lang="en-US" dirty="0"/>
-              <a:t> : Cmdlet{</a:t>
-            </a:r>
-          </a:p>
-          <a:p>
-            <a:pPr marL="457200" lvl="1" indent="0">
-              <a:buNone/>
-            </a:pPr>
-            <a:r>
-              <a:rPr lang="en-US" dirty="0"/>
-              <a:t>    [Parameter]</a:t>
-            </a:r>
-          </a:p>
-          <a:p>
-            <a:pPr marL="457200" lvl="1" indent="0">
-              <a:buNone/>
-            </a:pPr>
-            <a:r>
-              <a:rPr lang="en-US" dirty="0"/>
-              <a:t>    public string A;</a:t>
-            </a:r>
-          </a:p>
-          <a:p>
-            <a:pPr marL="457200" lvl="1" indent="0">
-              <a:buNone/>
-            </a:pPr>
-            <a:endParaRPr lang="en-US" dirty="0"/>
-          </a:p>
-          <a:p>
-            <a:pPr marL="457200" lvl="1" indent="0">
-              <a:buNone/>
-            </a:pPr>
-            <a:r>
-              <a:rPr lang="en-US" dirty="0"/>
-              <a:t>    [Parameter]</a:t>
-            </a:r>
-          </a:p>
-          <a:p>
-            <a:pPr marL="457200" lvl="1" indent="0">
-              <a:buNone/>
-            </a:pPr>
-            <a:r>
-              <a:rPr lang="en-US" dirty="0"/>
-              <a:t>    public string B;</a:t>
-            </a:r>
-          </a:p>
-          <a:p>
-            <a:pPr marL="457200" lvl="1" indent="0">
-              <a:buNone/>
-            </a:pPr>
-            <a:endParaRPr lang="en-US" dirty="0"/>
-          </a:p>
-          <a:p>
-            <a:pPr marL="457200" lvl="1" indent="0">
-              <a:buNone/>
-            </a:pPr>
-            <a:r>
-              <a:rPr lang="en-US" dirty="0"/>
-              <a:t>    protected override void </a:t>
-            </a:r>
-            <a:r>
-              <a:rPr lang="en-US" dirty="0" err="1"/>
-              <a:t>EndProcessing</a:t>
-            </a:r>
-            <a:r>
-              <a:rPr lang="en-US" dirty="0"/>
-              <a:t>(){</a:t>
-            </a:r>
-          </a:p>
-          <a:p>
-            <a:pPr marL="457200" lvl="1" indent="0">
-              <a:buNone/>
-            </a:pPr>
-            <a:r>
-              <a:rPr lang="en-US" dirty="0"/>
-              <a:t>        </a:t>
-            </a:r>
-            <a:r>
-              <a:rPr lang="en-US" dirty="0" err="1"/>
-              <a:t>WriteObject</a:t>
-            </a:r>
-            <a:r>
-              <a:rPr lang="en-US" dirty="0"/>
-              <a:t>(A+B);</a:t>
-            </a:r>
-          </a:p>
-          <a:p>
-            <a:pPr marL="457200" lvl="1" indent="0">
-              <a:buNone/>
-            </a:pPr>
-            <a:r>
-              <a:rPr lang="en-US" dirty="0"/>
-              <a:t>    }</a:t>
-            </a:r>
-          </a:p>
-          <a:p>
-            <a:pPr marL="457200" lvl="1" indent="0">
-              <a:buNone/>
-            </a:pPr>
-            <a:r>
-              <a:rPr lang="en-US" dirty="0"/>
-              <a:t>}</a:t>
-            </a:r>
-          </a:p>
-          <a:p>
-            <a:pPr marL="457200" lvl="1" indent="0">
-              <a:buNone/>
-            </a:pPr>
-            <a:r>
-              <a:rPr lang="en-US" dirty="0"/>
-              <a:t>'@ -</a:t>
-            </a:r>
-            <a:r>
-              <a:rPr lang="en-US" dirty="0" err="1"/>
-              <a:t>outputAssembly</a:t>
-            </a:r>
-            <a:r>
-              <a:rPr lang="en-US" dirty="0"/>
-              <a:t> c:\temp\AddCSharpStuff.dll</a:t>
+              <a:t>cdxml</a:t>
+            </a:r>
+            <a:r>
+              <a:rPr lang="en-US" dirty="0"/>
+              <a:t> modules (CIM Modules)</a:t>
+            </a:r>
+          </a:p>
+          <a:p>
+            <a:r>
+              <a:rPr lang="en-US" dirty="0"/>
+              <a:t>Demo</a:t>
             </a:r>
           </a:p>
         </p:txBody>
@@ -8142,7 +8881,7 @@
     </p:spTree>
     <p:extLst>
       <p:ext uri="{BB962C8B-B14F-4D97-AF65-F5344CB8AC3E}">
-        <p14:creationId xmlns:p14="http://schemas.microsoft.com/office/powerpoint/2010/main" val="3754694344"/>
+        <p14:creationId xmlns:p14="http://schemas.microsoft.com/office/powerpoint/2010/main" val="1628238970"/>
       </p:ext>
     </p:extLst>
   </p:cSld>

</xml_diff>